<commit_message>
Cambios documentales de evidencia funcional
Cambios documentales de evidencia funcional
</commit_message>
<xml_diff>
--- a/Documentación/Sprint 5/MVC - Arquitectura - AtomHuron.pptx
+++ b/Documentación/Sprint 5/MVC - Arquitectura - AtomHuron.pptx
@@ -7,6 +7,9 @@
   <p:sldIdLst>
     <p:sldId id="256" r:id="rId2"/>
     <p:sldId id="257" r:id="rId3"/>
+    <p:sldId id="258" r:id="rId4"/>
+    <p:sldId id="259" r:id="rId5"/>
+    <p:sldId id="260" r:id="rId6"/>
   </p:sldIdLst>
   <p:sldSz cx="12192000" cy="6858000"/>
   <p:notesSz cx="6858000" cy="9144000"/>
@@ -262,7 +265,7 @@
           <a:p>
             <a:fld id="{64BD6723-B9F0-4BB8-80B0-9F2117FFF4B6}" type="datetimeFigureOut">
               <a:rPr lang="es-CO" smtClean="0"/>
-              <a:t>18/09/2021</a:t>
+              <a:t>14/10/2021</a:t>
             </a:fld>
             <a:endParaRPr lang="es-CO"/>
           </a:p>
@@ -462,7 +465,7 @@
           <a:p>
             <a:fld id="{64BD6723-B9F0-4BB8-80B0-9F2117FFF4B6}" type="datetimeFigureOut">
               <a:rPr lang="es-CO" smtClean="0"/>
-              <a:t>18/09/2021</a:t>
+              <a:t>14/10/2021</a:t>
             </a:fld>
             <a:endParaRPr lang="es-CO"/>
           </a:p>
@@ -672,7 +675,7 @@
           <a:p>
             <a:fld id="{64BD6723-B9F0-4BB8-80B0-9F2117FFF4B6}" type="datetimeFigureOut">
               <a:rPr lang="es-CO" smtClean="0"/>
-              <a:t>18/09/2021</a:t>
+              <a:t>14/10/2021</a:t>
             </a:fld>
             <a:endParaRPr lang="es-CO"/>
           </a:p>
@@ -872,7 +875,7 @@
           <a:p>
             <a:fld id="{64BD6723-B9F0-4BB8-80B0-9F2117FFF4B6}" type="datetimeFigureOut">
               <a:rPr lang="es-CO" smtClean="0"/>
-              <a:t>18/09/2021</a:t>
+              <a:t>14/10/2021</a:t>
             </a:fld>
             <a:endParaRPr lang="es-CO"/>
           </a:p>
@@ -1148,7 +1151,7 @@
           <a:p>
             <a:fld id="{64BD6723-B9F0-4BB8-80B0-9F2117FFF4B6}" type="datetimeFigureOut">
               <a:rPr lang="es-CO" smtClean="0"/>
-              <a:t>18/09/2021</a:t>
+              <a:t>14/10/2021</a:t>
             </a:fld>
             <a:endParaRPr lang="es-CO"/>
           </a:p>
@@ -1416,7 +1419,7 @@
           <a:p>
             <a:fld id="{64BD6723-B9F0-4BB8-80B0-9F2117FFF4B6}" type="datetimeFigureOut">
               <a:rPr lang="es-CO" smtClean="0"/>
-              <a:t>18/09/2021</a:t>
+              <a:t>14/10/2021</a:t>
             </a:fld>
             <a:endParaRPr lang="es-CO"/>
           </a:p>
@@ -1831,7 +1834,7 @@
           <a:p>
             <a:fld id="{64BD6723-B9F0-4BB8-80B0-9F2117FFF4B6}" type="datetimeFigureOut">
               <a:rPr lang="es-CO" smtClean="0"/>
-              <a:t>18/09/2021</a:t>
+              <a:t>14/10/2021</a:t>
             </a:fld>
             <a:endParaRPr lang="es-CO"/>
           </a:p>
@@ -1973,7 +1976,7 @@
           <a:p>
             <a:fld id="{64BD6723-B9F0-4BB8-80B0-9F2117FFF4B6}" type="datetimeFigureOut">
               <a:rPr lang="es-CO" smtClean="0"/>
-              <a:t>18/09/2021</a:t>
+              <a:t>14/10/2021</a:t>
             </a:fld>
             <a:endParaRPr lang="es-CO"/>
           </a:p>
@@ -2086,7 +2089,7 @@
           <a:p>
             <a:fld id="{64BD6723-B9F0-4BB8-80B0-9F2117FFF4B6}" type="datetimeFigureOut">
               <a:rPr lang="es-CO" smtClean="0"/>
-              <a:t>18/09/2021</a:t>
+              <a:t>14/10/2021</a:t>
             </a:fld>
             <a:endParaRPr lang="es-CO"/>
           </a:p>
@@ -2399,7 +2402,7 @@
           <a:p>
             <a:fld id="{64BD6723-B9F0-4BB8-80B0-9F2117FFF4B6}" type="datetimeFigureOut">
               <a:rPr lang="es-CO" smtClean="0"/>
-              <a:t>18/09/2021</a:t>
+              <a:t>14/10/2021</a:t>
             </a:fld>
             <a:endParaRPr lang="es-CO"/>
           </a:p>
@@ -2688,7 +2691,7 @@
           <a:p>
             <a:fld id="{64BD6723-B9F0-4BB8-80B0-9F2117FFF4B6}" type="datetimeFigureOut">
               <a:rPr lang="es-CO" smtClean="0"/>
-              <a:t>18/09/2021</a:t>
+              <a:t>14/10/2021</a:t>
             </a:fld>
             <a:endParaRPr lang="es-CO"/>
           </a:p>
@@ -2931,7 +2934,7 @@
           <a:p>
             <a:fld id="{64BD6723-B9F0-4BB8-80B0-9F2117FFF4B6}" type="datetimeFigureOut">
               <a:rPr lang="es-CO" smtClean="0"/>
-              <a:t>18/09/2021</a:t>
+              <a:t>14/10/2021</a:t>
             </a:fld>
             <a:endParaRPr lang="es-CO"/>
           </a:p>
@@ -6976,6 +6979,2507 @@
 </p:sld>
 </file>
 
+<file path=ppt/slides/slide3.xml><?xml version="1.0" encoding="utf-8"?>
+<p:sld xmlns:a="http://schemas.openxmlformats.org/drawingml/2006/main" xmlns:r="http://schemas.openxmlformats.org/officeDocument/2006/relationships" xmlns:p="http://schemas.openxmlformats.org/presentationml/2006/main">
+  <p:cSld>
+    <p:spTree>
+      <p:nvGrpSpPr>
+        <p:cNvPr id="1" name=""/>
+        <p:cNvGrpSpPr/>
+        <p:nvPr/>
+      </p:nvGrpSpPr>
+      <p:grpSpPr>
+        <a:xfrm>
+          <a:off x="0" y="0"/>
+          <a:ext cx="0" cy="0"/>
+          <a:chOff x="0" y="0"/>
+          <a:chExt cx="0" cy="0"/>
+        </a:xfrm>
+      </p:grpSpPr>
+      <p:sp>
+        <p:nvSpPr>
+          <p:cNvPr id="2" name="Rectángulo: esquinas redondeadas 1">
+            <a:extLst>
+              <a:ext uri="{FF2B5EF4-FFF2-40B4-BE49-F238E27FC236}">
+                <a16:creationId xmlns:a16="http://schemas.microsoft.com/office/drawing/2014/main" id="{309C93FF-9C62-40E2-8AD0-3AD6656C5E84}"/>
+              </a:ext>
+            </a:extLst>
+          </p:cNvPr>
+          <p:cNvSpPr/>
+          <p:nvPr/>
+        </p:nvSpPr>
+        <p:spPr>
+          <a:xfrm>
+            <a:off x="89166" y="106421"/>
+            <a:ext cx="12013667" cy="516367"/>
+          </a:xfrm>
+          <a:prstGeom prst="roundRect">
+            <a:avLst/>
+          </a:prstGeom>
+          <a:solidFill>
+            <a:schemeClr val="tx2">
+              <a:lumMod val="75000"/>
+            </a:schemeClr>
+          </a:solidFill>
+        </p:spPr>
+        <p:style>
+          <a:lnRef idx="2">
+            <a:schemeClr val="accent1">
+              <a:shade val="50000"/>
+            </a:schemeClr>
+          </a:lnRef>
+          <a:fillRef idx="1">
+            <a:schemeClr val="accent1"/>
+          </a:fillRef>
+          <a:effectRef idx="0">
+            <a:schemeClr val="accent1"/>
+          </a:effectRef>
+          <a:fontRef idx="minor">
+            <a:schemeClr val="lt1"/>
+          </a:fontRef>
+        </p:style>
+        <p:txBody>
+          <a:bodyPr rtlCol="0" anchor="ctr"/>
+          <a:lstStyle/>
+          <a:p>
+            <a:pPr algn="ctr"/>
+            <a:r>
+              <a:rPr lang="es-CO" sz="2800" dirty="0">
+                <a:effectLst>
+                  <a:outerShdw blurRad="38100" dist="38100" dir="2700000" algn="tl">
+                    <a:srgbClr val="000000">
+                      <a:alpha val="43137"/>
+                    </a:srgbClr>
+                  </a:outerShdw>
+                </a:effectLst>
+              </a:rPr>
+              <a:t>Arquitectura - </a:t>
+            </a:r>
+            <a:r>
+              <a:rPr lang="es-CO" sz="2800" dirty="0" err="1">
+                <a:effectLst>
+                  <a:outerShdw blurRad="38100" dist="38100" dir="2700000" algn="tl">
+                    <a:srgbClr val="000000">
+                      <a:alpha val="43137"/>
+                    </a:srgbClr>
+                  </a:outerShdw>
+                </a:effectLst>
+              </a:rPr>
+              <a:t>Atom</a:t>
+            </a:r>
+            <a:r>
+              <a:rPr lang="es-CO" sz="2800" dirty="0">
+                <a:effectLst>
+                  <a:outerShdw blurRad="38100" dist="38100" dir="2700000" algn="tl">
+                    <a:srgbClr val="000000">
+                      <a:alpha val="43137"/>
+                    </a:srgbClr>
+                  </a:outerShdw>
+                </a:effectLst>
+              </a:rPr>
+              <a:t>-Huron </a:t>
+            </a:r>
+          </a:p>
+        </p:txBody>
+      </p:sp>
+      <p:grpSp>
+        <p:nvGrpSpPr>
+          <p:cNvPr id="49" name="Grupo 48">
+            <a:extLst>
+              <a:ext uri="{FF2B5EF4-FFF2-40B4-BE49-F238E27FC236}">
+                <a16:creationId xmlns:a16="http://schemas.microsoft.com/office/drawing/2014/main" id="{B1F8B1D6-59F2-4A39-9B9E-BFAE5C23BE92}"/>
+              </a:ext>
+            </a:extLst>
+          </p:cNvPr>
+          <p:cNvGrpSpPr/>
+          <p:nvPr/>
+        </p:nvGrpSpPr>
+        <p:grpSpPr>
+          <a:xfrm>
+            <a:off x="2599224" y="1630656"/>
+            <a:ext cx="2010984" cy="2069573"/>
+            <a:chOff x="3674529" y="2239734"/>
+            <a:chExt cx="3494616" cy="2912661"/>
+          </a:xfrm>
+        </p:grpSpPr>
+        <p:pic>
+          <p:nvPicPr>
+            <p:cNvPr id="53" name="Picture 6" descr="Science Atom Png - Atomo Icon Png Transparent PNG - 1024x1024 - Free  Download on NicePNG">
+              <a:extLst>
+                <a:ext uri="{FF2B5EF4-FFF2-40B4-BE49-F238E27FC236}">
+                  <a16:creationId xmlns:a16="http://schemas.microsoft.com/office/drawing/2014/main" id="{63A13782-F871-455C-A011-265AD25CFB7E}"/>
+                </a:ext>
+              </a:extLst>
+            </p:cNvPr>
+            <p:cNvPicPr>
+              <a:picLocks noChangeAspect="1" noChangeArrowheads="1"/>
+            </p:cNvPicPr>
+            <p:nvPr/>
+          </p:nvPicPr>
+          <p:blipFill>
+            <a:blip r:embed="rId2">
+              <a:extLst>
+                <a:ext uri="{BEBA8EAE-BF5A-486C-A8C5-ECC9F3942E4B}">
+                  <a14:imgProps xmlns:a14="http://schemas.microsoft.com/office/drawing/2010/main">
+                    <a14:imgLayer r:embed="rId3">
+                      <a14:imgEffect>
+                        <a14:backgroundRemoval t="5694" b="97516" l="1463" r="97683">
+                          <a14:foregroundMark x1="41707" y1="10766" x2="48293" y2="5797"/>
+                          <a14:foregroundMark x1="48293" y1="5797" x2="55610" y2="9938"/>
+                          <a14:foregroundMark x1="55610" y1="9938" x2="55976" y2="9938"/>
+                          <a14:foregroundMark x1="88049" y1="25052" x2="96829" y2="25052"/>
+                          <a14:foregroundMark x1="96829" y1="25052" x2="97683" y2="34886"/>
+                          <a14:foregroundMark x1="97683" y1="34886" x2="87927" y2="43375"/>
+                          <a14:foregroundMark x1="51341" y1="48240" x2="51341" y2="48240"/>
+                          <a14:foregroundMark x1="11463" y1="46791" x2="5122" y2="42340"/>
+                          <a14:foregroundMark x1="5122" y1="42340" x2="10854" y2="43996"/>
+                          <a14:foregroundMark x1="2683" y1="34783" x2="3049" y2="28157"/>
+                          <a14:foregroundMark x1="3415" y1="66460" x2="1707" y2="73810"/>
+                          <a14:foregroundMark x1="1707" y1="73810" x2="5854" y2="75983"/>
+                          <a14:foregroundMark x1="40000" y1="87474" x2="45366" y2="93271"/>
+                          <a14:foregroundMark x1="45366" y1="93271" x2="53902" y2="94203"/>
+                          <a14:foregroundMark x1="53902" y1="94203" x2="62439" y2="88716"/>
+                          <a14:foregroundMark x1="62439" y1="88716" x2="57805" y2="90166"/>
+                          <a14:foregroundMark x1="44634" y1="93582" x2="54146" y2="96687"/>
+                          <a14:foregroundMark x1="54146" y1="96687" x2="43537" y2="95238"/>
+                          <a14:foregroundMark x1="43537" y1="95238" x2="51341" y2="97516"/>
+                        </a14:backgroundRemoval>
+                      </a14:imgEffect>
+                    </a14:imgLayer>
+                  </a14:imgProps>
+                </a:ext>
+                <a:ext uri="{28A0092B-C50C-407E-A947-70E740481C1C}">
+                  <a14:useLocalDpi xmlns:a14="http://schemas.microsoft.com/office/drawing/2010/main" val="0"/>
+                </a:ext>
+              </a:extLst>
+            </a:blip>
+            <a:srcRect/>
+            <a:stretch>
+              <a:fillRect/>
+            </a:stretch>
+          </p:blipFill>
+          <p:spPr bwMode="auto">
+            <a:xfrm rot="19969979">
+              <a:off x="3674529" y="2239734"/>
+              <a:ext cx="2036585" cy="2399249"/>
+            </a:xfrm>
+            <a:prstGeom prst="rect">
+              <a:avLst/>
+            </a:prstGeom>
+            <a:noFill/>
+            <a:extLst>
+              <a:ext uri="{909E8E84-426E-40DD-AFC4-6F175D3DCCD1}">
+                <a14:hiddenFill xmlns:a14="http://schemas.microsoft.com/office/drawing/2010/main">
+                  <a:solidFill>
+                    <a:srgbClr val="FFFFFF"/>
+                  </a:solidFill>
+                </a14:hiddenFill>
+              </a:ext>
+            </a:extLst>
+          </p:spPr>
+        </p:pic>
+        <p:pic>
+          <p:nvPicPr>
+            <p:cNvPr id="58" name="Picture 2" descr="Legend of Korra Pabu&amp;quot; Kids T-Shirt by CassidyCreates | Redbubble">
+              <a:extLst>
+                <a:ext uri="{FF2B5EF4-FFF2-40B4-BE49-F238E27FC236}">
+                  <a16:creationId xmlns:a16="http://schemas.microsoft.com/office/drawing/2014/main" id="{6583D9AF-828B-4B21-9752-A768341FDAE6}"/>
+                </a:ext>
+              </a:extLst>
+            </p:cNvPr>
+            <p:cNvPicPr>
+              <a:picLocks noChangeAspect="1" noChangeArrowheads="1"/>
+            </p:cNvPicPr>
+            <p:nvPr/>
+          </p:nvPicPr>
+          <p:blipFill>
+            <a:blip r:embed="rId4">
+              <a:extLst>
+                <a:ext uri="{BEBA8EAE-BF5A-486C-A8C5-ECC9F3942E4B}">
+                  <a14:imgProps xmlns:a14="http://schemas.microsoft.com/office/drawing/2010/main">
+                    <a14:imgLayer r:embed="rId5">
+                      <a14:imgEffect>
+                        <a14:backgroundRemoval t="10000" b="90000" l="5200" r="94133">
+                          <a14:foregroundMark x1="25200" y1="15500" x2="15467" y2="15500"/>
+                          <a14:foregroundMark x1="15467" y1="15500" x2="15733" y2="22100"/>
+                          <a14:foregroundMark x1="16800" y1="16000" x2="45333" y2="15400"/>
+                          <a14:foregroundMark x1="45333" y1="15400" x2="52533" y2="23100"/>
+                          <a14:foregroundMark x1="52533" y1="23100" x2="43067" y2="25100"/>
+                          <a14:foregroundMark x1="43067" y1="25100" x2="16400" y2="23300"/>
+                          <a14:foregroundMark x1="16400" y1="23300" x2="13867" y2="16000"/>
+                          <a14:foregroundMark x1="13867" y1="16000" x2="24133" y2="14900"/>
+                          <a14:foregroundMark x1="24133" y1="14900" x2="28533" y2="17100"/>
+                          <a14:foregroundMark x1="83041" y1="58086" x2="92670" y2="70600"/>
+                          <a14:foregroundMark x1="93128" y1="75600" x2="91733" y2="79900"/>
+                          <a14:foregroundMark x1="93374" y1="74841" x2="93128" y2="75600"/>
+                          <a14:foregroundMark x1="91733" y1="79900" x2="83600" y2="85700"/>
+                          <a14:foregroundMark x1="83600" y1="85700" x2="82062" y2="58977"/>
+                          <a14:foregroundMark x1="13707" y1="75549" x2="10745" y2="75638"/>
+                          <a14:foregroundMark x1="8127" y1="74685" x2="13600" y2="72500"/>
+                          <a14:foregroundMark x1="13600" y1="72500" x2="14247" y2="73621"/>
+                          <a14:foregroundMark x1="9867" y1="66800" x2="15467" y2="61100"/>
+                          <a14:foregroundMark x1="16687" y1="55800" x2="17171" y2="53698"/>
+                          <a14:foregroundMark x1="15997" y1="58800" x2="16063" y2="58512"/>
+                          <a14:foregroundMark x1="15928" y1="59100" x2="15997" y2="58800"/>
+                          <a14:foregroundMark x1="15467" y1="61100" x2="15928" y2="59100"/>
+                          <a14:foregroundMark x1="22444" y1="30314" x2="16667" y2="24700"/>
+                          <a14:foregroundMark x1="16667" y1="24700" x2="15733" y2="21200"/>
+                          <a14:foregroundMark x1="93490" y1="74779" x2="93680" y2="75407"/>
+                          <a14:foregroundMark x1="92315" y1="70900" x2="93150" y2="73658"/>
+                          <a14:foregroundMark x1="92133" y1="70300" x2="92224" y2="70600"/>
+                          <a14:foregroundMark x1="87333" y1="63400" x2="91467" y2="78200"/>
+                          <a14:backgroundMark x1="82400" y1="57400" x2="82400" y2="57400"/>
+                          <a14:backgroundMark x1="82400" y1="57400" x2="83467" y2="57700"/>
+                          <a14:backgroundMark x1="83200" y1="58100" x2="83200" y2="58100"/>
+                          <a14:backgroundMark x1="82800" y1="57500" x2="83467" y2="57600"/>
+                          <a14:backgroundMark x1="83067" y1="57800" x2="83067" y2="57800"/>
+                          <a14:backgroundMark x1="16267" y1="74900" x2="13467" y2="75300"/>
+                          <a14:backgroundMark x1="11333" y1="76400" x2="4533" y2="75600"/>
+                          <a14:backgroundMark x1="9733" y1="67400" x2="9733" y2="67000"/>
+                          <a14:backgroundMark x1="9867" y1="66700" x2="9867" y2="66700"/>
+                          <a14:backgroundMark x1="16267" y1="57300" x2="16267" y2="57300"/>
+                          <a14:backgroundMark x1="16133" y1="56000" x2="15867" y2="58500"/>
+                          <a14:backgroundMark x1="16133" y1="58700" x2="16133" y2="58700"/>
+                          <a14:backgroundMark x1="16800" y1="56100" x2="16800" y2="56100"/>
+                          <a14:backgroundMark x1="16267" y1="56000" x2="16267" y2="56000"/>
+                          <a14:backgroundMark x1="16400" y1="55800" x2="16400" y2="55800"/>
+                          <a14:backgroundMark x1="16400" y1="56000" x2="16400" y2="56000"/>
+                          <a14:backgroundMark x1="16800" y1="56000" x2="16800" y2="56000"/>
+                          <a14:backgroundMark x1="15867" y1="59100" x2="15867" y2="59100"/>
+                          <a14:backgroundMark x1="15600" y1="58800" x2="15600" y2="58800"/>
+                          <a14:backgroundMark x1="17467" y1="50800" x2="21733" y2="31900"/>
+                          <a14:backgroundMark x1="21733" y1="31900" x2="18933" y2="31200"/>
+                          <a14:backgroundMark x1="20133" y1="46200" x2="20933" y2="33100"/>
+                          <a14:backgroundMark x1="22667" y1="36700" x2="19600" y2="30500"/>
+                          <a14:backgroundMark x1="21867" y1="35300" x2="22667" y2="33700"/>
+                          <a14:backgroundMark x1="21733" y1="36400" x2="20933" y2="31400"/>
+                          <a14:backgroundMark x1="20667" y1="30400" x2="18267" y2="48200"/>
+                          <a14:backgroundMark x1="14400" y1="37500" x2="14400" y2="40700"/>
+                          <a14:backgroundMark x1="18267" y1="48700" x2="18267" y2="48700"/>
+                          <a14:backgroundMark x1="17867" y1="47200" x2="18133" y2="49400"/>
+                          <a14:backgroundMark x1="96000" y1="75200" x2="95467" y2="78400"/>
+                          <a14:backgroundMark x1="94000" y1="73200" x2="94933" y2="74000"/>
+                          <a14:backgroundMark x1="94533" y1="75600" x2="94533" y2="75600"/>
+                          <a14:backgroundMark x1="93733" y1="70600" x2="93733" y2="70600"/>
+                          <a14:backgroundMark x1="93733" y1="70600" x2="93733" y2="70900"/>
+                        </a14:backgroundRemoval>
+                      </a14:imgEffect>
+                    </a14:imgLayer>
+                  </a14:imgProps>
+                </a:ext>
+                <a:ext uri="{28A0092B-C50C-407E-A947-70E740481C1C}">
+                  <a14:useLocalDpi xmlns:a14="http://schemas.microsoft.com/office/drawing/2010/main" val="0"/>
+                </a:ext>
+              </a:extLst>
+            </a:blip>
+            <a:srcRect/>
+            <a:stretch>
+              <a:fillRect/>
+            </a:stretch>
+          </p:blipFill>
+          <p:spPr bwMode="auto">
+            <a:xfrm>
+              <a:off x="5060955" y="2341476"/>
+              <a:ext cx="2108190" cy="2810919"/>
+            </a:xfrm>
+            <a:prstGeom prst="rect">
+              <a:avLst/>
+            </a:prstGeom>
+            <a:noFill/>
+            <a:effectLst>
+              <a:outerShdw blurRad="50800" dist="38100" dir="5400000" algn="t" rotWithShape="0">
+                <a:prstClr val="black">
+                  <a:alpha val="40000"/>
+                </a:prstClr>
+              </a:outerShdw>
+            </a:effectLst>
+            <a:extLst>
+              <a:ext uri="{909E8E84-426E-40DD-AFC4-6F175D3DCCD1}">
+                <a14:hiddenFill xmlns:a14="http://schemas.microsoft.com/office/drawing/2010/main">
+                  <a:solidFill>
+                    <a:srgbClr val="FFFFFF"/>
+                  </a:solidFill>
+                </a14:hiddenFill>
+              </a:ext>
+            </a:extLst>
+          </p:spPr>
+        </p:pic>
+      </p:grpSp>
+      <p:grpSp>
+        <p:nvGrpSpPr>
+          <p:cNvPr id="4" name="Grupo 3">
+            <a:extLst>
+              <a:ext uri="{FF2B5EF4-FFF2-40B4-BE49-F238E27FC236}">
+                <a16:creationId xmlns:a16="http://schemas.microsoft.com/office/drawing/2014/main" id="{16964CE2-3343-4BFB-98DE-61BE1CDB6F23}"/>
+              </a:ext>
+            </a:extLst>
+          </p:cNvPr>
+          <p:cNvGrpSpPr/>
+          <p:nvPr/>
+        </p:nvGrpSpPr>
+        <p:grpSpPr>
+          <a:xfrm>
+            <a:off x="5802747" y="788310"/>
+            <a:ext cx="2181225" cy="2640690"/>
+            <a:chOff x="5736908" y="1596390"/>
+            <a:chExt cx="2181225" cy="2640690"/>
+          </a:xfrm>
+        </p:grpSpPr>
+        <p:pic>
+          <p:nvPicPr>
+            <p:cNvPr id="1030" name="Picture 6" descr="What is MongoDB? The NoSQL database explained to you easily">
+              <a:extLst>
+                <a:ext uri="{FF2B5EF4-FFF2-40B4-BE49-F238E27FC236}">
+                  <a16:creationId xmlns:a16="http://schemas.microsoft.com/office/drawing/2014/main" id="{1BE1E969-2D2C-403E-B7D3-61E014BDAC12}"/>
+                </a:ext>
+              </a:extLst>
+            </p:cNvPr>
+            <p:cNvPicPr>
+              <a:picLocks noChangeAspect="1" noChangeArrowheads="1"/>
+            </p:cNvPicPr>
+            <p:nvPr/>
+          </p:nvPicPr>
+          <p:blipFill rotWithShape="1">
+            <a:blip r:embed="rId6">
+              <a:extLst>
+                <a:ext uri="{28A0092B-C50C-407E-A947-70E740481C1C}">
+                  <a14:useLocalDpi xmlns:a14="http://schemas.microsoft.com/office/drawing/2010/main" val="0"/>
+                </a:ext>
+              </a:extLst>
+            </a:blip>
+            <a:srcRect b="30841"/>
+            <a:stretch/>
+          </p:blipFill>
+          <p:spPr bwMode="auto">
+            <a:xfrm>
+              <a:off x="5736908" y="1596390"/>
+              <a:ext cx="2181225" cy="2028937"/>
+            </a:xfrm>
+            <a:prstGeom prst="rect">
+              <a:avLst/>
+            </a:prstGeom>
+            <a:noFill/>
+            <a:extLst>
+              <a:ext uri="{909E8E84-426E-40DD-AFC4-6F175D3DCCD1}">
+                <a14:hiddenFill xmlns:a14="http://schemas.microsoft.com/office/drawing/2010/main">
+                  <a:solidFill>
+                    <a:srgbClr val="FFFFFF"/>
+                  </a:solidFill>
+                </a14:hiddenFill>
+              </a:ext>
+            </a:extLst>
+          </p:spPr>
+        </p:pic>
+        <p:pic>
+          <p:nvPicPr>
+            <p:cNvPr id="1028" name="Picture 4" descr="MongoDB Atlas Adds Serverless Option | The Motley Fool">
+              <a:extLst>
+                <a:ext uri="{FF2B5EF4-FFF2-40B4-BE49-F238E27FC236}">
+                  <a16:creationId xmlns:a16="http://schemas.microsoft.com/office/drawing/2014/main" id="{599A8470-DB53-4169-8AD6-7B5B9116B70E}"/>
+                </a:ext>
+              </a:extLst>
+            </p:cNvPr>
+            <p:cNvPicPr>
+              <a:picLocks noChangeAspect="1" noChangeArrowheads="1"/>
+            </p:cNvPicPr>
+            <p:nvPr/>
+          </p:nvPicPr>
+          <p:blipFill rotWithShape="1">
+            <a:blip r:embed="rId7">
+              <a:extLst>
+                <a:ext uri="{28A0092B-C50C-407E-A947-70E740481C1C}">
+                  <a14:useLocalDpi xmlns:a14="http://schemas.microsoft.com/office/drawing/2010/main" val="0"/>
+                </a:ext>
+              </a:extLst>
+            </a:blip>
+            <a:srcRect l="37232" t="23216" r="36604" b="22509"/>
+            <a:stretch/>
+          </p:blipFill>
+          <p:spPr bwMode="auto">
+            <a:xfrm>
+              <a:off x="6935084" y="3013573"/>
+              <a:ext cx="983049" cy="1223507"/>
+            </a:xfrm>
+            <a:prstGeom prst="rect">
+              <a:avLst/>
+            </a:prstGeom>
+            <a:noFill/>
+            <a:extLst>
+              <a:ext uri="{909E8E84-426E-40DD-AFC4-6F175D3DCCD1}">
+                <a14:hiddenFill xmlns:a14="http://schemas.microsoft.com/office/drawing/2010/main">
+                  <a:solidFill>
+                    <a:srgbClr val="FFFFFF"/>
+                  </a:solidFill>
+                </a14:hiddenFill>
+              </a:ext>
+            </a:extLst>
+          </p:spPr>
+        </p:pic>
+      </p:grpSp>
+      <p:cxnSp>
+        <p:nvCxnSpPr>
+          <p:cNvPr id="8" name="Conector: curvado 7">
+            <a:extLst>
+              <a:ext uri="{FF2B5EF4-FFF2-40B4-BE49-F238E27FC236}">
+                <a16:creationId xmlns:a16="http://schemas.microsoft.com/office/drawing/2014/main" id="{2C8257CD-F569-446C-9C33-1588DFFF7733}"/>
+              </a:ext>
+            </a:extLst>
+          </p:cNvPr>
+          <p:cNvCxnSpPr>
+            <a:stCxn id="58" idx="3"/>
+            <a:endCxn id="1030" idx="1"/>
+          </p:cNvCxnSpPr>
+          <p:nvPr/>
+        </p:nvCxnSpPr>
+        <p:spPr>
+          <a:xfrm flipV="1">
+            <a:off x="4610208" y="1802779"/>
+            <a:ext cx="1192539" cy="898810"/>
+          </a:xfrm>
+          <a:prstGeom prst="curvedConnector3">
+            <a:avLst/>
+          </a:prstGeom>
+          <a:ln w="57150">
+            <a:solidFill>
+              <a:schemeClr val="tx2">
+                <a:lumMod val="75000"/>
+              </a:schemeClr>
+            </a:solidFill>
+            <a:headEnd type="triangle"/>
+            <a:tailEnd type="triangle"/>
+          </a:ln>
+        </p:spPr>
+        <p:style>
+          <a:lnRef idx="1">
+            <a:schemeClr val="accent1"/>
+          </a:lnRef>
+          <a:fillRef idx="0">
+            <a:schemeClr val="accent1"/>
+          </a:fillRef>
+          <a:effectRef idx="0">
+            <a:schemeClr val="accent1"/>
+          </a:effectRef>
+          <a:fontRef idx="minor">
+            <a:schemeClr val="tx1"/>
+          </a:fontRef>
+        </p:style>
+      </p:cxnSp>
+      <p:pic>
+        <p:nvPicPr>
+          <p:cNvPr id="1032" name="Picture 8" descr="Logo Heroku PNG transparente - StickPNG">
+            <a:extLst>
+              <a:ext uri="{FF2B5EF4-FFF2-40B4-BE49-F238E27FC236}">
+                <a16:creationId xmlns:a16="http://schemas.microsoft.com/office/drawing/2014/main" id="{4E78052B-C847-4B7F-A1F6-AF15ED66295E}"/>
+              </a:ext>
+            </a:extLst>
+          </p:cNvPr>
+          <p:cNvPicPr>
+            <a:picLocks noChangeAspect="1" noChangeArrowheads="1"/>
+          </p:cNvPicPr>
+          <p:nvPr/>
+        </p:nvPicPr>
+        <p:blipFill>
+          <a:blip r:embed="rId8">
+            <a:extLst>
+              <a:ext uri="{28A0092B-C50C-407E-A947-70E740481C1C}">
+                <a14:useLocalDpi xmlns:a14="http://schemas.microsoft.com/office/drawing/2010/main" val="0"/>
+              </a:ext>
+            </a:extLst>
+          </a:blip>
+          <a:srcRect/>
+          <a:stretch>
+            <a:fillRect/>
+          </a:stretch>
+        </p:blipFill>
+        <p:spPr bwMode="auto">
+          <a:xfrm>
+            <a:off x="7689272" y="4040754"/>
+            <a:ext cx="2104910" cy="2104910"/>
+          </a:xfrm>
+          <a:prstGeom prst="rect">
+            <a:avLst/>
+          </a:prstGeom>
+          <a:noFill/>
+          <a:extLst>
+            <a:ext uri="{909E8E84-426E-40DD-AFC4-6F175D3DCCD1}">
+              <a14:hiddenFill xmlns:a14="http://schemas.microsoft.com/office/drawing/2010/main">
+                <a:solidFill>
+                  <a:srgbClr val="FFFFFF"/>
+                </a:solidFill>
+              </a14:hiddenFill>
+            </a:ext>
+          </a:extLst>
+        </p:spPr>
+      </p:pic>
+      <p:cxnSp>
+        <p:nvCxnSpPr>
+          <p:cNvPr id="51" name="Conector: curvado 50">
+            <a:extLst>
+              <a:ext uri="{FF2B5EF4-FFF2-40B4-BE49-F238E27FC236}">
+                <a16:creationId xmlns:a16="http://schemas.microsoft.com/office/drawing/2014/main" id="{44C6489F-4AB8-4C03-9A33-3B9C7C7728D7}"/>
+              </a:ext>
+            </a:extLst>
+          </p:cNvPr>
+          <p:cNvCxnSpPr>
+            <a:cxnSpLocks/>
+            <a:stCxn id="58" idx="2"/>
+            <a:endCxn id="1032" idx="1"/>
+          </p:cNvCxnSpPr>
+          <p:nvPr/>
+        </p:nvCxnSpPr>
+        <p:spPr>
+          <a:xfrm rot="16200000" flipH="1">
+            <a:off x="5149959" y="2553896"/>
+            <a:ext cx="1392980" cy="3685645"/>
+          </a:xfrm>
+          <a:prstGeom prst="curvedConnector2">
+            <a:avLst/>
+          </a:prstGeom>
+          <a:ln w="57150">
+            <a:solidFill>
+              <a:schemeClr val="tx2">
+                <a:lumMod val="75000"/>
+              </a:schemeClr>
+            </a:solidFill>
+            <a:headEnd type="triangle"/>
+            <a:tailEnd type="triangle"/>
+          </a:ln>
+        </p:spPr>
+        <p:style>
+          <a:lnRef idx="1">
+            <a:schemeClr val="accent1"/>
+          </a:lnRef>
+          <a:fillRef idx="0">
+            <a:schemeClr val="accent1"/>
+          </a:fillRef>
+          <a:effectRef idx="0">
+            <a:schemeClr val="accent1"/>
+          </a:effectRef>
+          <a:fontRef idx="minor">
+            <a:schemeClr val="tx1"/>
+          </a:fontRef>
+        </p:style>
+      </p:cxnSp>
+      <p:cxnSp>
+        <p:nvCxnSpPr>
+          <p:cNvPr id="52" name="Conector: curvado 51">
+            <a:extLst>
+              <a:ext uri="{FF2B5EF4-FFF2-40B4-BE49-F238E27FC236}">
+                <a16:creationId xmlns:a16="http://schemas.microsoft.com/office/drawing/2014/main" id="{7DCAE7C1-4F43-40C1-A0BB-900BB6620A9F}"/>
+              </a:ext>
+            </a:extLst>
+          </p:cNvPr>
+          <p:cNvCxnSpPr>
+            <a:cxnSpLocks/>
+            <a:stCxn id="1032" idx="0"/>
+            <a:endCxn id="1030" idx="3"/>
+          </p:cNvCxnSpPr>
+          <p:nvPr/>
+        </p:nvCxnSpPr>
+        <p:spPr>
+          <a:xfrm rot="16200000" flipV="1">
+            <a:off x="7243863" y="2542889"/>
+            <a:ext cx="2237975" cy="757755"/>
+          </a:xfrm>
+          <a:prstGeom prst="curvedConnector2">
+            <a:avLst/>
+          </a:prstGeom>
+          <a:ln w="57150">
+            <a:solidFill>
+              <a:schemeClr val="tx2">
+                <a:lumMod val="75000"/>
+              </a:schemeClr>
+            </a:solidFill>
+            <a:headEnd type="triangle"/>
+            <a:tailEnd type="triangle"/>
+          </a:ln>
+        </p:spPr>
+        <p:style>
+          <a:lnRef idx="1">
+            <a:schemeClr val="accent1"/>
+          </a:lnRef>
+          <a:fillRef idx="0">
+            <a:schemeClr val="accent1"/>
+          </a:fillRef>
+          <a:effectRef idx="0">
+            <a:schemeClr val="accent1"/>
+          </a:effectRef>
+          <a:fontRef idx="minor">
+            <a:schemeClr val="tx1"/>
+          </a:fontRef>
+        </p:style>
+      </p:cxnSp>
+      <p:pic>
+        <p:nvPicPr>
+          <p:cNvPr id="1034" name="Picture 10" descr="Emanuel Goette, alias Crespo: Haciendo indices con MongoDB">
+            <a:extLst>
+              <a:ext uri="{FF2B5EF4-FFF2-40B4-BE49-F238E27FC236}">
+                <a16:creationId xmlns:a16="http://schemas.microsoft.com/office/drawing/2014/main" id="{A013F562-005D-4A65-B886-9CA713811F39}"/>
+              </a:ext>
+            </a:extLst>
+          </p:cNvPr>
+          <p:cNvPicPr>
+            <a:picLocks noChangeAspect="1" noChangeArrowheads="1"/>
+          </p:cNvPicPr>
+          <p:nvPr/>
+        </p:nvPicPr>
+        <p:blipFill>
+          <a:blip r:embed="rId9">
+            <a:extLst>
+              <a:ext uri="{28A0092B-C50C-407E-A947-70E740481C1C}">
+                <a14:useLocalDpi xmlns:a14="http://schemas.microsoft.com/office/drawing/2010/main" val="0"/>
+              </a:ext>
+            </a:extLst>
+          </a:blip>
+          <a:srcRect/>
+          <a:stretch>
+            <a:fillRect/>
+          </a:stretch>
+        </p:blipFill>
+        <p:spPr bwMode="auto">
+          <a:xfrm>
+            <a:off x="210602" y="3071404"/>
+            <a:ext cx="1834832" cy="2150263"/>
+          </a:xfrm>
+          <a:prstGeom prst="rect">
+            <a:avLst/>
+          </a:prstGeom>
+          <a:noFill/>
+          <a:extLst>
+            <a:ext uri="{909E8E84-426E-40DD-AFC4-6F175D3DCCD1}">
+              <a14:hiddenFill xmlns:a14="http://schemas.microsoft.com/office/drawing/2010/main">
+                <a:solidFill>
+                  <a:srgbClr val="FFFFFF"/>
+                </a:solidFill>
+              </a14:hiddenFill>
+            </a:ext>
+          </a:extLst>
+        </p:spPr>
+      </p:pic>
+      <p:sp>
+        <p:nvSpPr>
+          <p:cNvPr id="17" name="CuadroTexto 16">
+            <a:extLst>
+              <a:ext uri="{FF2B5EF4-FFF2-40B4-BE49-F238E27FC236}">
+                <a16:creationId xmlns:a16="http://schemas.microsoft.com/office/drawing/2014/main" id="{CA1995A8-C931-487D-A315-31A8869ABFE7}"/>
+              </a:ext>
+            </a:extLst>
+          </p:cNvPr>
+          <p:cNvSpPr txBox="1"/>
+          <p:nvPr/>
+        </p:nvSpPr>
+        <p:spPr>
+          <a:xfrm>
+            <a:off x="257217" y="4908543"/>
+            <a:ext cx="1741602" cy="369332"/>
+          </a:xfrm>
+          <a:prstGeom prst="rect">
+            <a:avLst/>
+          </a:prstGeom>
+          <a:noFill/>
+        </p:spPr>
+        <p:txBody>
+          <a:bodyPr wrap="square" rtlCol="0">
+            <a:spAutoFit/>
+          </a:bodyPr>
+          <a:lstStyle/>
+          <a:p>
+            <a:r>
+              <a:rPr lang="es-CO" dirty="0"/>
+              <a:t>Local </a:t>
+            </a:r>
+            <a:r>
+              <a:rPr lang="es-CO" dirty="0" err="1"/>
+              <a:t>Database</a:t>
+            </a:r>
+            <a:endParaRPr lang="es-CO" dirty="0"/>
+          </a:p>
+        </p:txBody>
+      </p:sp>
+      <p:cxnSp>
+        <p:nvCxnSpPr>
+          <p:cNvPr id="59" name="Conector: curvado 58">
+            <a:extLst>
+              <a:ext uri="{FF2B5EF4-FFF2-40B4-BE49-F238E27FC236}">
+                <a16:creationId xmlns:a16="http://schemas.microsoft.com/office/drawing/2014/main" id="{F81906BD-D5D8-460C-A10D-E4C9F368EA1C}"/>
+              </a:ext>
+            </a:extLst>
+          </p:cNvPr>
+          <p:cNvCxnSpPr>
+            <a:cxnSpLocks/>
+            <a:stCxn id="1034" idx="3"/>
+            <a:endCxn id="53" idx="1"/>
+          </p:cNvCxnSpPr>
+          <p:nvPr/>
+        </p:nvCxnSpPr>
+        <p:spPr>
+          <a:xfrm flipV="1">
+            <a:off x="2045434" y="2750591"/>
+            <a:ext cx="618436" cy="1395945"/>
+          </a:xfrm>
+          <a:prstGeom prst="curvedConnector3">
+            <a:avLst>
+              <a:gd name="adj1" fmla="val 50000"/>
+            </a:avLst>
+          </a:prstGeom>
+          <a:ln w="19050">
+            <a:solidFill>
+              <a:srgbClr val="C00000"/>
+            </a:solidFill>
+            <a:prstDash val="dashDot"/>
+            <a:headEnd type="triangle"/>
+            <a:tailEnd type="triangle"/>
+          </a:ln>
+        </p:spPr>
+        <p:style>
+          <a:lnRef idx="1">
+            <a:schemeClr val="accent1"/>
+          </a:lnRef>
+          <a:fillRef idx="0">
+            <a:schemeClr val="accent1"/>
+          </a:fillRef>
+          <a:effectRef idx="0">
+            <a:schemeClr val="accent1"/>
+          </a:effectRef>
+          <a:fontRef idx="minor">
+            <a:schemeClr val="tx1"/>
+          </a:fontRef>
+        </p:style>
+      </p:cxnSp>
+      <p:sp>
+        <p:nvSpPr>
+          <p:cNvPr id="25" name="CuadroTexto 24">
+            <a:extLst>
+              <a:ext uri="{FF2B5EF4-FFF2-40B4-BE49-F238E27FC236}">
+                <a16:creationId xmlns:a16="http://schemas.microsoft.com/office/drawing/2014/main" id="{558324F7-3024-41F0-A2A6-982465EEC4DA}"/>
+              </a:ext>
+            </a:extLst>
+          </p:cNvPr>
+          <p:cNvSpPr txBox="1"/>
+          <p:nvPr/>
+        </p:nvSpPr>
+        <p:spPr>
+          <a:xfrm>
+            <a:off x="1687031" y="2668425"/>
+            <a:ext cx="716803" cy="1015663"/>
+          </a:xfrm>
+          <a:prstGeom prst="rect">
+            <a:avLst/>
+          </a:prstGeom>
+          <a:noFill/>
+        </p:spPr>
+        <p:txBody>
+          <a:bodyPr wrap="square" rtlCol="0">
+            <a:spAutoFit/>
+          </a:bodyPr>
+          <a:lstStyle/>
+          <a:p>
+            <a:r>
+              <a:rPr lang="es-CO" sz="6000" dirty="0">
+                <a:solidFill>
+                  <a:srgbClr val="C00000"/>
+                </a:solidFill>
+              </a:rPr>
+              <a:t>X</a:t>
+            </a:r>
+          </a:p>
+        </p:txBody>
+      </p:sp>
+      <p:pic>
+        <p:nvPicPr>
+          <p:cNvPr id="27" name="Gráfico 26" descr="Completado con relleno sólido">
+            <a:extLst>
+              <a:ext uri="{FF2B5EF4-FFF2-40B4-BE49-F238E27FC236}">
+                <a16:creationId xmlns:a16="http://schemas.microsoft.com/office/drawing/2014/main" id="{AE6245A4-192B-41A1-B35E-1FA4670B4F9C}"/>
+              </a:ext>
+            </a:extLst>
+          </p:cNvPr>
+          <p:cNvPicPr>
+            <a:picLocks noChangeAspect="1"/>
+          </p:cNvPicPr>
+          <p:nvPr/>
+        </p:nvPicPr>
+        <p:blipFill>
+          <a:blip r:embed="rId10">
+            <a:extLst>
+              <a:ext uri="{28A0092B-C50C-407E-A947-70E740481C1C}">
+                <a14:useLocalDpi xmlns:a14="http://schemas.microsoft.com/office/drawing/2010/main" val="0"/>
+              </a:ext>
+              <a:ext uri="{96DAC541-7B7A-43D3-8B79-37D633B846F1}">
+                <asvg:svgBlip xmlns:asvg="http://schemas.microsoft.com/office/drawing/2016/SVG/main" r:embed="rId11"/>
+              </a:ext>
+            </a:extLst>
+          </a:blip>
+          <a:stretch>
+            <a:fillRect/>
+          </a:stretch>
+        </p:blipFill>
+        <p:spPr>
+          <a:xfrm>
+            <a:off x="4384655" y="1338269"/>
+            <a:ext cx="914400" cy="1184612"/>
+          </a:xfrm>
+          <a:prstGeom prst="rect">
+            <a:avLst/>
+          </a:prstGeom>
+        </p:spPr>
+      </p:pic>
+    </p:spTree>
+    <p:extLst>
+      <p:ext uri="{BB962C8B-B14F-4D97-AF65-F5344CB8AC3E}">
+        <p14:creationId xmlns:p14="http://schemas.microsoft.com/office/powerpoint/2010/main" val="3085953821"/>
+      </p:ext>
+    </p:extLst>
+  </p:cSld>
+  <p:clrMapOvr>
+    <a:masterClrMapping/>
+  </p:clrMapOvr>
+</p:sld>
+</file>
+
+<file path=ppt/slides/slide4.xml><?xml version="1.0" encoding="utf-8"?>
+<p:sld xmlns:a="http://schemas.openxmlformats.org/drawingml/2006/main" xmlns:r="http://schemas.openxmlformats.org/officeDocument/2006/relationships" xmlns:p="http://schemas.openxmlformats.org/presentationml/2006/main">
+  <p:cSld>
+    <p:spTree>
+      <p:nvGrpSpPr>
+        <p:cNvPr id="1" name=""/>
+        <p:cNvGrpSpPr/>
+        <p:nvPr/>
+      </p:nvGrpSpPr>
+      <p:grpSpPr>
+        <a:xfrm>
+          <a:off x="0" y="0"/>
+          <a:ext cx="0" cy="0"/>
+          <a:chOff x="0" y="0"/>
+          <a:chExt cx="0" cy="0"/>
+        </a:xfrm>
+      </p:grpSpPr>
+      <p:sp>
+        <p:nvSpPr>
+          <p:cNvPr id="2" name="Rectángulo: esquinas redondeadas 1">
+            <a:extLst>
+              <a:ext uri="{FF2B5EF4-FFF2-40B4-BE49-F238E27FC236}">
+                <a16:creationId xmlns:a16="http://schemas.microsoft.com/office/drawing/2014/main" id="{309C93FF-9C62-40E2-8AD0-3AD6656C5E84}"/>
+              </a:ext>
+            </a:extLst>
+          </p:cNvPr>
+          <p:cNvSpPr/>
+          <p:nvPr/>
+        </p:nvSpPr>
+        <p:spPr>
+          <a:xfrm>
+            <a:off x="0" y="31989"/>
+            <a:ext cx="12013667" cy="516367"/>
+          </a:xfrm>
+          <a:prstGeom prst="roundRect">
+            <a:avLst/>
+          </a:prstGeom>
+          <a:solidFill>
+            <a:schemeClr val="tx2">
+              <a:lumMod val="75000"/>
+            </a:schemeClr>
+          </a:solidFill>
+        </p:spPr>
+        <p:style>
+          <a:lnRef idx="2">
+            <a:schemeClr val="accent1">
+              <a:shade val="50000"/>
+            </a:schemeClr>
+          </a:lnRef>
+          <a:fillRef idx="1">
+            <a:schemeClr val="accent1"/>
+          </a:fillRef>
+          <a:effectRef idx="0">
+            <a:schemeClr val="accent1"/>
+          </a:effectRef>
+          <a:fontRef idx="minor">
+            <a:schemeClr val="lt1"/>
+          </a:fontRef>
+        </p:style>
+        <p:txBody>
+          <a:bodyPr rtlCol="0" anchor="ctr"/>
+          <a:lstStyle/>
+          <a:p>
+            <a:pPr algn="ctr"/>
+            <a:r>
+              <a:rPr lang="es-CO" sz="2800" dirty="0">
+                <a:effectLst>
+                  <a:outerShdw blurRad="38100" dist="38100" dir="2700000" algn="tl">
+                    <a:srgbClr val="000000">
+                      <a:alpha val="43137"/>
+                    </a:srgbClr>
+                  </a:outerShdw>
+                </a:effectLst>
+              </a:rPr>
+              <a:t>Arquitectura - </a:t>
+            </a:r>
+            <a:r>
+              <a:rPr lang="es-CO" sz="2800" dirty="0" err="1">
+                <a:effectLst>
+                  <a:outerShdw blurRad="38100" dist="38100" dir="2700000" algn="tl">
+                    <a:srgbClr val="000000">
+                      <a:alpha val="43137"/>
+                    </a:srgbClr>
+                  </a:outerShdw>
+                </a:effectLst>
+              </a:rPr>
+              <a:t>Atom</a:t>
+            </a:r>
+            <a:r>
+              <a:rPr lang="es-CO" sz="2800" dirty="0">
+                <a:effectLst>
+                  <a:outerShdw blurRad="38100" dist="38100" dir="2700000" algn="tl">
+                    <a:srgbClr val="000000">
+                      <a:alpha val="43137"/>
+                    </a:srgbClr>
+                  </a:outerShdw>
+                </a:effectLst>
+              </a:rPr>
+              <a:t>-Huron </a:t>
+            </a:r>
+          </a:p>
+        </p:txBody>
+      </p:sp>
+      <p:grpSp>
+        <p:nvGrpSpPr>
+          <p:cNvPr id="49" name="Grupo 48">
+            <a:extLst>
+              <a:ext uri="{FF2B5EF4-FFF2-40B4-BE49-F238E27FC236}">
+                <a16:creationId xmlns:a16="http://schemas.microsoft.com/office/drawing/2014/main" id="{B1F8B1D6-59F2-4A39-9B9E-BFAE5C23BE92}"/>
+              </a:ext>
+            </a:extLst>
+          </p:cNvPr>
+          <p:cNvGrpSpPr/>
+          <p:nvPr/>
+        </p:nvGrpSpPr>
+        <p:grpSpPr>
+          <a:xfrm>
+            <a:off x="92692" y="2234280"/>
+            <a:ext cx="1378913" cy="1400223"/>
+            <a:chOff x="3674529" y="2239734"/>
+            <a:chExt cx="3494616" cy="2912661"/>
+          </a:xfrm>
+        </p:grpSpPr>
+        <p:pic>
+          <p:nvPicPr>
+            <p:cNvPr id="53" name="Picture 6" descr="Science Atom Png - Atomo Icon Png Transparent PNG - 1024x1024 - Free  Download on NicePNG">
+              <a:extLst>
+                <a:ext uri="{FF2B5EF4-FFF2-40B4-BE49-F238E27FC236}">
+                  <a16:creationId xmlns:a16="http://schemas.microsoft.com/office/drawing/2014/main" id="{63A13782-F871-455C-A011-265AD25CFB7E}"/>
+                </a:ext>
+              </a:extLst>
+            </p:cNvPr>
+            <p:cNvPicPr>
+              <a:picLocks noChangeAspect="1" noChangeArrowheads="1"/>
+            </p:cNvPicPr>
+            <p:nvPr/>
+          </p:nvPicPr>
+          <p:blipFill>
+            <a:blip r:embed="rId2">
+              <a:extLst>
+                <a:ext uri="{BEBA8EAE-BF5A-486C-A8C5-ECC9F3942E4B}">
+                  <a14:imgProps xmlns:a14="http://schemas.microsoft.com/office/drawing/2010/main">
+                    <a14:imgLayer r:embed="rId3">
+                      <a14:imgEffect>
+                        <a14:backgroundRemoval t="5694" b="97516" l="1463" r="97683">
+                          <a14:foregroundMark x1="41707" y1="10766" x2="48293" y2="5797"/>
+                          <a14:foregroundMark x1="48293" y1="5797" x2="55610" y2="9938"/>
+                          <a14:foregroundMark x1="55610" y1="9938" x2="55976" y2="9938"/>
+                          <a14:foregroundMark x1="88049" y1="25052" x2="96829" y2="25052"/>
+                          <a14:foregroundMark x1="96829" y1="25052" x2="97683" y2="34886"/>
+                          <a14:foregroundMark x1="97683" y1="34886" x2="87927" y2="43375"/>
+                          <a14:foregroundMark x1="51341" y1="48240" x2="51341" y2="48240"/>
+                          <a14:foregroundMark x1="11463" y1="46791" x2="5122" y2="42340"/>
+                          <a14:foregroundMark x1="5122" y1="42340" x2="10854" y2="43996"/>
+                          <a14:foregroundMark x1="2683" y1="34783" x2="3049" y2="28157"/>
+                          <a14:foregroundMark x1="3415" y1="66460" x2="1707" y2="73810"/>
+                          <a14:foregroundMark x1="1707" y1="73810" x2="5854" y2="75983"/>
+                          <a14:foregroundMark x1="40000" y1="87474" x2="45366" y2="93271"/>
+                          <a14:foregroundMark x1="45366" y1="93271" x2="53902" y2="94203"/>
+                          <a14:foregroundMark x1="53902" y1="94203" x2="62439" y2="88716"/>
+                          <a14:foregroundMark x1="62439" y1="88716" x2="57805" y2="90166"/>
+                          <a14:foregroundMark x1="44634" y1="93582" x2="54146" y2="96687"/>
+                          <a14:foregroundMark x1="54146" y1="96687" x2="43537" y2="95238"/>
+                          <a14:foregroundMark x1="43537" y1="95238" x2="51341" y2="97516"/>
+                        </a14:backgroundRemoval>
+                      </a14:imgEffect>
+                    </a14:imgLayer>
+                  </a14:imgProps>
+                </a:ext>
+                <a:ext uri="{28A0092B-C50C-407E-A947-70E740481C1C}">
+                  <a14:useLocalDpi xmlns:a14="http://schemas.microsoft.com/office/drawing/2010/main" val="0"/>
+                </a:ext>
+              </a:extLst>
+            </a:blip>
+            <a:srcRect/>
+            <a:stretch>
+              <a:fillRect/>
+            </a:stretch>
+          </p:blipFill>
+          <p:spPr bwMode="auto">
+            <a:xfrm rot="19969979">
+              <a:off x="3674529" y="2239734"/>
+              <a:ext cx="2036585" cy="2399249"/>
+            </a:xfrm>
+            <a:prstGeom prst="rect">
+              <a:avLst/>
+            </a:prstGeom>
+            <a:noFill/>
+            <a:extLst>
+              <a:ext uri="{909E8E84-426E-40DD-AFC4-6F175D3DCCD1}">
+                <a14:hiddenFill xmlns:a14="http://schemas.microsoft.com/office/drawing/2010/main">
+                  <a:solidFill>
+                    <a:srgbClr val="FFFFFF"/>
+                  </a:solidFill>
+                </a14:hiddenFill>
+              </a:ext>
+            </a:extLst>
+          </p:spPr>
+        </p:pic>
+        <p:pic>
+          <p:nvPicPr>
+            <p:cNvPr id="58" name="Picture 2" descr="Legend of Korra Pabu&amp;quot; Kids T-Shirt by CassidyCreates | Redbubble">
+              <a:extLst>
+                <a:ext uri="{FF2B5EF4-FFF2-40B4-BE49-F238E27FC236}">
+                  <a16:creationId xmlns:a16="http://schemas.microsoft.com/office/drawing/2014/main" id="{6583D9AF-828B-4B21-9752-A768341FDAE6}"/>
+                </a:ext>
+              </a:extLst>
+            </p:cNvPr>
+            <p:cNvPicPr>
+              <a:picLocks noChangeAspect="1" noChangeArrowheads="1"/>
+            </p:cNvPicPr>
+            <p:nvPr/>
+          </p:nvPicPr>
+          <p:blipFill>
+            <a:blip r:embed="rId4">
+              <a:extLst>
+                <a:ext uri="{BEBA8EAE-BF5A-486C-A8C5-ECC9F3942E4B}">
+                  <a14:imgProps xmlns:a14="http://schemas.microsoft.com/office/drawing/2010/main">
+                    <a14:imgLayer r:embed="rId5">
+                      <a14:imgEffect>
+                        <a14:backgroundRemoval t="10000" b="90000" l="5200" r="94133">
+                          <a14:foregroundMark x1="25200" y1="15500" x2="15467" y2="15500"/>
+                          <a14:foregroundMark x1="15467" y1="15500" x2="15733" y2="22100"/>
+                          <a14:foregroundMark x1="16800" y1="16000" x2="45333" y2="15400"/>
+                          <a14:foregroundMark x1="45333" y1="15400" x2="52533" y2="23100"/>
+                          <a14:foregroundMark x1="52533" y1="23100" x2="43067" y2="25100"/>
+                          <a14:foregroundMark x1="43067" y1="25100" x2="16400" y2="23300"/>
+                          <a14:foregroundMark x1="16400" y1="23300" x2="13867" y2="16000"/>
+                          <a14:foregroundMark x1="13867" y1="16000" x2="24133" y2="14900"/>
+                          <a14:foregroundMark x1="24133" y1="14900" x2="28533" y2="17100"/>
+                          <a14:foregroundMark x1="83041" y1="58086" x2="92670" y2="70600"/>
+                          <a14:foregroundMark x1="93128" y1="75600" x2="91733" y2="79900"/>
+                          <a14:foregroundMark x1="93374" y1="74841" x2="93128" y2="75600"/>
+                          <a14:foregroundMark x1="91733" y1="79900" x2="83600" y2="85700"/>
+                          <a14:foregroundMark x1="83600" y1="85700" x2="82062" y2="58977"/>
+                          <a14:foregroundMark x1="13707" y1="75549" x2="10745" y2="75638"/>
+                          <a14:foregroundMark x1="8127" y1="74685" x2="13600" y2="72500"/>
+                          <a14:foregroundMark x1="13600" y1="72500" x2="14247" y2="73621"/>
+                          <a14:foregroundMark x1="9867" y1="66800" x2="15467" y2="61100"/>
+                          <a14:foregroundMark x1="16687" y1="55800" x2="17171" y2="53698"/>
+                          <a14:foregroundMark x1="15997" y1="58800" x2="16063" y2="58512"/>
+                          <a14:foregroundMark x1="15928" y1="59100" x2="15997" y2="58800"/>
+                          <a14:foregroundMark x1="15467" y1="61100" x2="15928" y2="59100"/>
+                          <a14:foregroundMark x1="22444" y1="30314" x2="16667" y2="24700"/>
+                          <a14:foregroundMark x1="16667" y1="24700" x2="15733" y2="21200"/>
+                          <a14:foregroundMark x1="93490" y1="74779" x2="93680" y2="75407"/>
+                          <a14:foregroundMark x1="92315" y1="70900" x2="93150" y2="73658"/>
+                          <a14:foregroundMark x1="92133" y1="70300" x2="92224" y2="70600"/>
+                          <a14:foregroundMark x1="87333" y1="63400" x2="91467" y2="78200"/>
+                          <a14:backgroundMark x1="82400" y1="57400" x2="82400" y2="57400"/>
+                          <a14:backgroundMark x1="82400" y1="57400" x2="83467" y2="57700"/>
+                          <a14:backgroundMark x1="83200" y1="58100" x2="83200" y2="58100"/>
+                          <a14:backgroundMark x1="82800" y1="57500" x2="83467" y2="57600"/>
+                          <a14:backgroundMark x1="83067" y1="57800" x2="83067" y2="57800"/>
+                          <a14:backgroundMark x1="16267" y1="74900" x2="13467" y2="75300"/>
+                          <a14:backgroundMark x1="11333" y1="76400" x2="4533" y2="75600"/>
+                          <a14:backgroundMark x1="9733" y1="67400" x2="9733" y2="67000"/>
+                          <a14:backgroundMark x1="9867" y1="66700" x2="9867" y2="66700"/>
+                          <a14:backgroundMark x1="16267" y1="57300" x2="16267" y2="57300"/>
+                          <a14:backgroundMark x1="16133" y1="56000" x2="15867" y2="58500"/>
+                          <a14:backgroundMark x1="16133" y1="58700" x2="16133" y2="58700"/>
+                          <a14:backgroundMark x1="16800" y1="56100" x2="16800" y2="56100"/>
+                          <a14:backgroundMark x1="16267" y1="56000" x2="16267" y2="56000"/>
+                          <a14:backgroundMark x1="16400" y1="55800" x2="16400" y2="55800"/>
+                          <a14:backgroundMark x1="16400" y1="56000" x2="16400" y2="56000"/>
+                          <a14:backgroundMark x1="16800" y1="56000" x2="16800" y2="56000"/>
+                          <a14:backgroundMark x1="15867" y1="59100" x2="15867" y2="59100"/>
+                          <a14:backgroundMark x1="15600" y1="58800" x2="15600" y2="58800"/>
+                          <a14:backgroundMark x1="17467" y1="50800" x2="21733" y2="31900"/>
+                          <a14:backgroundMark x1="21733" y1="31900" x2="18933" y2="31200"/>
+                          <a14:backgroundMark x1="20133" y1="46200" x2="20933" y2="33100"/>
+                          <a14:backgroundMark x1="22667" y1="36700" x2="19600" y2="30500"/>
+                          <a14:backgroundMark x1="21867" y1="35300" x2="22667" y2="33700"/>
+                          <a14:backgroundMark x1="21733" y1="36400" x2="20933" y2="31400"/>
+                          <a14:backgroundMark x1="20667" y1="30400" x2="18267" y2="48200"/>
+                          <a14:backgroundMark x1="14400" y1="37500" x2="14400" y2="40700"/>
+                          <a14:backgroundMark x1="18267" y1="48700" x2="18267" y2="48700"/>
+                          <a14:backgroundMark x1="17867" y1="47200" x2="18133" y2="49400"/>
+                          <a14:backgroundMark x1="96000" y1="75200" x2="95467" y2="78400"/>
+                          <a14:backgroundMark x1="94000" y1="73200" x2="94933" y2="74000"/>
+                          <a14:backgroundMark x1="94533" y1="75600" x2="94533" y2="75600"/>
+                          <a14:backgroundMark x1="93733" y1="70600" x2="93733" y2="70600"/>
+                          <a14:backgroundMark x1="93733" y1="70600" x2="93733" y2="70900"/>
+                        </a14:backgroundRemoval>
+                      </a14:imgEffect>
+                    </a14:imgLayer>
+                  </a14:imgProps>
+                </a:ext>
+                <a:ext uri="{28A0092B-C50C-407E-A947-70E740481C1C}">
+                  <a14:useLocalDpi xmlns:a14="http://schemas.microsoft.com/office/drawing/2010/main" val="0"/>
+                </a:ext>
+              </a:extLst>
+            </a:blip>
+            <a:srcRect/>
+            <a:stretch>
+              <a:fillRect/>
+            </a:stretch>
+          </p:blipFill>
+          <p:spPr bwMode="auto">
+            <a:xfrm>
+              <a:off x="5060955" y="2341476"/>
+              <a:ext cx="2108190" cy="2810919"/>
+            </a:xfrm>
+            <a:prstGeom prst="rect">
+              <a:avLst/>
+            </a:prstGeom>
+            <a:noFill/>
+            <a:effectLst>
+              <a:outerShdw blurRad="50800" dist="38100" dir="5400000" algn="t" rotWithShape="0">
+                <a:prstClr val="black">
+                  <a:alpha val="40000"/>
+                </a:prstClr>
+              </a:outerShdw>
+            </a:effectLst>
+            <a:extLst>
+              <a:ext uri="{909E8E84-426E-40DD-AFC4-6F175D3DCCD1}">
+                <a14:hiddenFill xmlns:a14="http://schemas.microsoft.com/office/drawing/2010/main">
+                  <a:solidFill>
+                    <a:srgbClr val="FFFFFF"/>
+                  </a:solidFill>
+                </a14:hiddenFill>
+              </a:ext>
+            </a:extLst>
+          </p:spPr>
+        </p:pic>
+      </p:grpSp>
+      <p:grpSp>
+        <p:nvGrpSpPr>
+          <p:cNvPr id="4" name="Grupo 3">
+            <a:extLst>
+              <a:ext uri="{FF2B5EF4-FFF2-40B4-BE49-F238E27FC236}">
+                <a16:creationId xmlns:a16="http://schemas.microsoft.com/office/drawing/2014/main" id="{16964CE2-3343-4BFB-98DE-61BE1CDB6F23}"/>
+              </a:ext>
+            </a:extLst>
+          </p:cNvPr>
+          <p:cNvGrpSpPr/>
+          <p:nvPr/>
+        </p:nvGrpSpPr>
+        <p:grpSpPr>
+          <a:xfrm>
+            <a:off x="2434649" y="929264"/>
+            <a:ext cx="1495645" cy="1786627"/>
+            <a:chOff x="5736908" y="1596390"/>
+            <a:chExt cx="2181225" cy="2640690"/>
+          </a:xfrm>
+        </p:grpSpPr>
+        <p:pic>
+          <p:nvPicPr>
+            <p:cNvPr id="1030" name="Picture 6" descr="What is MongoDB? The NoSQL database explained to you easily">
+              <a:extLst>
+                <a:ext uri="{FF2B5EF4-FFF2-40B4-BE49-F238E27FC236}">
+                  <a16:creationId xmlns:a16="http://schemas.microsoft.com/office/drawing/2014/main" id="{1BE1E969-2D2C-403E-B7D3-61E014BDAC12}"/>
+                </a:ext>
+              </a:extLst>
+            </p:cNvPr>
+            <p:cNvPicPr>
+              <a:picLocks noChangeAspect="1" noChangeArrowheads="1"/>
+            </p:cNvPicPr>
+            <p:nvPr/>
+          </p:nvPicPr>
+          <p:blipFill rotWithShape="1">
+            <a:blip r:embed="rId6">
+              <a:extLst>
+                <a:ext uri="{28A0092B-C50C-407E-A947-70E740481C1C}">
+                  <a14:useLocalDpi xmlns:a14="http://schemas.microsoft.com/office/drawing/2010/main" val="0"/>
+                </a:ext>
+              </a:extLst>
+            </a:blip>
+            <a:srcRect b="30841"/>
+            <a:stretch/>
+          </p:blipFill>
+          <p:spPr bwMode="auto">
+            <a:xfrm>
+              <a:off x="5736908" y="1596390"/>
+              <a:ext cx="2181225" cy="2028937"/>
+            </a:xfrm>
+            <a:prstGeom prst="rect">
+              <a:avLst/>
+            </a:prstGeom>
+            <a:noFill/>
+            <a:extLst>
+              <a:ext uri="{909E8E84-426E-40DD-AFC4-6F175D3DCCD1}">
+                <a14:hiddenFill xmlns:a14="http://schemas.microsoft.com/office/drawing/2010/main">
+                  <a:solidFill>
+                    <a:srgbClr val="FFFFFF"/>
+                  </a:solidFill>
+                </a14:hiddenFill>
+              </a:ext>
+            </a:extLst>
+          </p:spPr>
+        </p:pic>
+        <p:pic>
+          <p:nvPicPr>
+            <p:cNvPr id="1028" name="Picture 4" descr="MongoDB Atlas Adds Serverless Option | The Motley Fool">
+              <a:extLst>
+                <a:ext uri="{FF2B5EF4-FFF2-40B4-BE49-F238E27FC236}">
+                  <a16:creationId xmlns:a16="http://schemas.microsoft.com/office/drawing/2014/main" id="{599A8470-DB53-4169-8AD6-7B5B9116B70E}"/>
+                </a:ext>
+              </a:extLst>
+            </p:cNvPr>
+            <p:cNvPicPr>
+              <a:picLocks noChangeAspect="1" noChangeArrowheads="1"/>
+            </p:cNvPicPr>
+            <p:nvPr/>
+          </p:nvPicPr>
+          <p:blipFill rotWithShape="1">
+            <a:blip r:embed="rId7">
+              <a:extLst>
+                <a:ext uri="{28A0092B-C50C-407E-A947-70E740481C1C}">
+                  <a14:useLocalDpi xmlns:a14="http://schemas.microsoft.com/office/drawing/2010/main" val="0"/>
+                </a:ext>
+              </a:extLst>
+            </a:blip>
+            <a:srcRect l="37232" t="23216" r="36604" b="22509"/>
+            <a:stretch/>
+          </p:blipFill>
+          <p:spPr bwMode="auto">
+            <a:xfrm>
+              <a:off x="6935084" y="3013573"/>
+              <a:ext cx="983049" cy="1223507"/>
+            </a:xfrm>
+            <a:prstGeom prst="rect">
+              <a:avLst/>
+            </a:prstGeom>
+            <a:noFill/>
+            <a:extLst>
+              <a:ext uri="{909E8E84-426E-40DD-AFC4-6F175D3DCCD1}">
+                <a14:hiddenFill xmlns:a14="http://schemas.microsoft.com/office/drawing/2010/main">
+                  <a:solidFill>
+                    <a:srgbClr val="FFFFFF"/>
+                  </a:solidFill>
+                </a14:hiddenFill>
+              </a:ext>
+            </a:extLst>
+          </p:spPr>
+        </p:pic>
+      </p:grpSp>
+      <p:cxnSp>
+        <p:nvCxnSpPr>
+          <p:cNvPr id="8" name="Conector: curvado 7">
+            <a:extLst>
+              <a:ext uri="{FF2B5EF4-FFF2-40B4-BE49-F238E27FC236}">
+                <a16:creationId xmlns:a16="http://schemas.microsoft.com/office/drawing/2014/main" id="{2C8257CD-F569-446C-9C33-1588DFFF7733}"/>
+              </a:ext>
+            </a:extLst>
+          </p:cNvPr>
+          <p:cNvCxnSpPr>
+            <a:stCxn id="58" idx="3"/>
+            <a:endCxn id="1030" idx="1"/>
+          </p:cNvCxnSpPr>
+          <p:nvPr/>
+        </p:nvCxnSpPr>
+        <p:spPr>
+          <a:xfrm flipV="1">
+            <a:off x="1471605" y="1615629"/>
+            <a:ext cx="963044" cy="1343218"/>
+          </a:xfrm>
+          <a:prstGeom prst="curvedConnector3">
+            <a:avLst/>
+          </a:prstGeom>
+          <a:ln w="57150">
+            <a:solidFill>
+              <a:schemeClr val="tx2">
+                <a:lumMod val="75000"/>
+              </a:schemeClr>
+            </a:solidFill>
+            <a:headEnd type="triangle"/>
+            <a:tailEnd type="triangle"/>
+          </a:ln>
+        </p:spPr>
+        <p:style>
+          <a:lnRef idx="1">
+            <a:schemeClr val="accent1"/>
+          </a:lnRef>
+          <a:fillRef idx="0">
+            <a:schemeClr val="accent1"/>
+          </a:fillRef>
+          <a:effectRef idx="0">
+            <a:schemeClr val="accent1"/>
+          </a:effectRef>
+          <a:fontRef idx="minor">
+            <a:schemeClr val="tx1"/>
+          </a:fontRef>
+        </p:style>
+      </p:cxnSp>
+      <p:pic>
+        <p:nvPicPr>
+          <p:cNvPr id="1032" name="Picture 8" descr="Logo Heroku PNG transparente - StickPNG">
+            <a:extLst>
+              <a:ext uri="{FF2B5EF4-FFF2-40B4-BE49-F238E27FC236}">
+                <a16:creationId xmlns:a16="http://schemas.microsoft.com/office/drawing/2014/main" id="{4E78052B-C847-4B7F-A1F6-AF15ED66295E}"/>
+              </a:ext>
+            </a:extLst>
+          </p:cNvPr>
+          <p:cNvPicPr>
+            <a:picLocks noChangeAspect="1" noChangeArrowheads="1"/>
+          </p:cNvPicPr>
+          <p:nvPr/>
+        </p:nvPicPr>
+        <p:blipFill>
+          <a:blip r:embed="rId8">
+            <a:extLst>
+              <a:ext uri="{28A0092B-C50C-407E-A947-70E740481C1C}">
+                <a14:useLocalDpi xmlns:a14="http://schemas.microsoft.com/office/drawing/2010/main" val="0"/>
+              </a:ext>
+            </a:extLst>
+          </a:blip>
+          <a:srcRect/>
+          <a:stretch>
+            <a:fillRect/>
+          </a:stretch>
+        </p:blipFill>
+        <p:spPr bwMode="auto">
+          <a:xfrm>
+            <a:off x="2894717" y="3756067"/>
+            <a:ext cx="1443317" cy="1443317"/>
+          </a:xfrm>
+          <a:prstGeom prst="rect">
+            <a:avLst/>
+          </a:prstGeom>
+          <a:noFill/>
+          <a:extLst>
+            <a:ext uri="{909E8E84-426E-40DD-AFC4-6F175D3DCCD1}">
+              <a14:hiddenFill xmlns:a14="http://schemas.microsoft.com/office/drawing/2010/main">
+                <a:solidFill>
+                  <a:srgbClr val="FFFFFF"/>
+                </a:solidFill>
+              </a14:hiddenFill>
+            </a:ext>
+          </a:extLst>
+        </p:spPr>
+      </p:pic>
+      <p:cxnSp>
+        <p:nvCxnSpPr>
+          <p:cNvPr id="51" name="Conector: curvado 50">
+            <a:extLst>
+              <a:ext uri="{FF2B5EF4-FFF2-40B4-BE49-F238E27FC236}">
+                <a16:creationId xmlns:a16="http://schemas.microsoft.com/office/drawing/2014/main" id="{44C6489F-4AB8-4C03-9A33-3B9C7C7728D7}"/>
+              </a:ext>
+            </a:extLst>
+          </p:cNvPr>
+          <p:cNvCxnSpPr>
+            <a:cxnSpLocks/>
+            <a:stCxn id="58" idx="2"/>
+            <a:endCxn id="1032" idx="1"/>
+          </p:cNvCxnSpPr>
+          <p:nvPr/>
+        </p:nvCxnSpPr>
+        <p:spPr>
+          <a:xfrm rot="16200000" flipH="1">
+            <a:off x="1553586" y="3136594"/>
+            <a:ext cx="843223" cy="1839039"/>
+          </a:xfrm>
+          <a:prstGeom prst="curvedConnector2">
+            <a:avLst/>
+          </a:prstGeom>
+          <a:ln w="57150">
+            <a:solidFill>
+              <a:schemeClr val="tx2">
+                <a:lumMod val="75000"/>
+              </a:schemeClr>
+            </a:solidFill>
+            <a:headEnd type="triangle"/>
+            <a:tailEnd type="triangle"/>
+          </a:ln>
+        </p:spPr>
+        <p:style>
+          <a:lnRef idx="1">
+            <a:schemeClr val="accent1"/>
+          </a:lnRef>
+          <a:fillRef idx="0">
+            <a:schemeClr val="accent1"/>
+          </a:fillRef>
+          <a:effectRef idx="0">
+            <a:schemeClr val="accent1"/>
+          </a:effectRef>
+          <a:fontRef idx="minor">
+            <a:schemeClr val="tx1"/>
+          </a:fontRef>
+        </p:style>
+      </p:cxnSp>
+      <p:cxnSp>
+        <p:nvCxnSpPr>
+          <p:cNvPr id="52" name="Conector: curvado 51">
+            <a:extLst>
+              <a:ext uri="{FF2B5EF4-FFF2-40B4-BE49-F238E27FC236}">
+                <a16:creationId xmlns:a16="http://schemas.microsoft.com/office/drawing/2014/main" id="{7DCAE7C1-4F43-40C1-A0BB-900BB6620A9F}"/>
+              </a:ext>
+            </a:extLst>
+          </p:cNvPr>
+          <p:cNvCxnSpPr>
+            <a:cxnSpLocks/>
+            <a:stCxn id="1032" idx="0"/>
+            <a:endCxn id="1030" idx="3"/>
+          </p:cNvCxnSpPr>
+          <p:nvPr/>
+        </p:nvCxnSpPr>
+        <p:spPr>
+          <a:xfrm rot="5400000" flipH="1" flipV="1">
+            <a:off x="2703116" y="2528889"/>
+            <a:ext cx="2140438" cy="313918"/>
+          </a:xfrm>
+          <a:prstGeom prst="curvedConnector4">
+            <a:avLst>
+              <a:gd name="adj1" fmla="val 33967"/>
+              <a:gd name="adj2" fmla="val 172822"/>
+            </a:avLst>
+          </a:prstGeom>
+          <a:ln w="57150">
+            <a:solidFill>
+              <a:schemeClr val="tx2">
+                <a:lumMod val="75000"/>
+              </a:schemeClr>
+            </a:solidFill>
+            <a:headEnd type="triangle"/>
+            <a:tailEnd type="triangle"/>
+          </a:ln>
+        </p:spPr>
+        <p:style>
+          <a:lnRef idx="1">
+            <a:schemeClr val="accent1"/>
+          </a:lnRef>
+          <a:fillRef idx="0">
+            <a:schemeClr val="accent1"/>
+          </a:fillRef>
+          <a:effectRef idx="0">
+            <a:schemeClr val="accent1"/>
+          </a:effectRef>
+          <a:fontRef idx="minor">
+            <a:schemeClr val="tx1"/>
+          </a:fontRef>
+        </p:style>
+      </p:cxnSp>
+      <p:pic>
+        <p:nvPicPr>
+          <p:cNvPr id="27" name="Gráfico 26" descr="Completado con relleno sólido">
+            <a:extLst>
+              <a:ext uri="{FF2B5EF4-FFF2-40B4-BE49-F238E27FC236}">
+                <a16:creationId xmlns:a16="http://schemas.microsoft.com/office/drawing/2014/main" id="{AE6245A4-192B-41A1-B35E-1FA4670B4F9C}"/>
+              </a:ext>
+            </a:extLst>
+          </p:cNvPr>
+          <p:cNvPicPr>
+            <a:picLocks noChangeAspect="1"/>
+          </p:cNvPicPr>
+          <p:nvPr/>
+        </p:nvPicPr>
+        <p:blipFill>
+          <a:blip r:embed="rId9">
+            <a:extLst>
+              <a:ext uri="{28A0092B-C50C-407E-A947-70E740481C1C}">
+                <a14:useLocalDpi xmlns:a14="http://schemas.microsoft.com/office/drawing/2010/main" val="0"/>
+              </a:ext>
+              <a:ext uri="{96DAC541-7B7A-43D3-8B79-37D633B846F1}">
+                <asvg:svgBlip xmlns:asvg="http://schemas.microsoft.com/office/drawing/2016/SVG/main" r:embed="rId10"/>
+              </a:ext>
+            </a:extLst>
+          </a:blip>
+          <a:stretch>
+            <a:fillRect/>
+          </a:stretch>
+        </p:blipFill>
+        <p:spPr>
+          <a:xfrm>
+            <a:off x="1326131" y="1923678"/>
+            <a:ext cx="626995" cy="812277"/>
+          </a:xfrm>
+          <a:prstGeom prst="rect">
+            <a:avLst/>
+          </a:prstGeom>
+        </p:spPr>
+      </p:pic>
+      <p:pic>
+        <p:nvPicPr>
+          <p:cNvPr id="7" name="Imagen 6" descr="Interfaz de usuario gráfica, Texto, Aplicación&#10;&#10;Descripción generada automáticamente">
+            <a:extLst>
+              <a:ext uri="{FF2B5EF4-FFF2-40B4-BE49-F238E27FC236}">
+                <a16:creationId xmlns:a16="http://schemas.microsoft.com/office/drawing/2014/main" id="{37EDB800-34CA-4A74-8A1B-E47713BEC471}"/>
+              </a:ext>
+            </a:extLst>
+          </p:cNvPr>
+          <p:cNvPicPr>
+            <a:picLocks noChangeAspect="1"/>
+          </p:cNvPicPr>
+          <p:nvPr/>
+        </p:nvPicPr>
+        <p:blipFill>
+          <a:blip r:embed="rId11"/>
+          <a:stretch>
+            <a:fillRect/>
+          </a:stretch>
+        </p:blipFill>
+        <p:spPr>
+          <a:xfrm>
+            <a:off x="5759407" y="588963"/>
+            <a:ext cx="3247628" cy="3565624"/>
+          </a:xfrm>
+          <a:prstGeom prst="rect">
+            <a:avLst/>
+          </a:prstGeom>
+        </p:spPr>
+      </p:pic>
+      <p:pic>
+        <p:nvPicPr>
+          <p:cNvPr id="12" name="Imagen 11" descr="Interfaz de usuario gráfica, Texto, Aplicación&#10;&#10;Descripción generada automáticamente">
+            <a:extLst>
+              <a:ext uri="{FF2B5EF4-FFF2-40B4-BE49-F238E27FC236}">
+                <a16:creationId xmlns:a16="http://schemas.microsoft.com/office/drawing/2014/main" id="{7B21B60F-840B-4C4F-B27A-ACFBF77F410C}"/>
+              </a:ext>
+            </a:extLst>
+          </p:cNvPr>
+          <p:cNvPicPr>
+            <a:picLocks noChangeAspect="1"/>
+          </p:cNvPicPr>
+          <p:nvPr/>
+        </p:nvPicPr>
+        <p:blipFill>
+          <a:blip r:embed="rId12"/>
+          <a:stretch>
+            <a:fillRect/>
+          </a:stretch>
+        </p:blipFill>
+        <p:spPr>
+          <a:xfrm>
+            <a:off x="4338034" y="4195195"/>
+            <a:ext cx="5492992" cy="2570415"/>
+          </a:xfrm>
+          <a:prstGeom prst="rect">
+            <a:avLst/>
+          </a:prstGeom>
+        </p:spPr>
+      </p:pic>
+    </p:spTree>
+    <p:extLst>
+      <p:ext uri="{BB962C8B-B14F-4D97-AF65-F5344CB8AC3E}">
+        <p14:creationId xmlns:p14="http://schemas.microsoft.com/office/powerpoint/2010/main" val="3016813782"/>
+      </p:ext>
+    </p:extLst>
+  </p:cSld>
+  <p:clrMapOvr>
+    <a:masterClrMapping/>
+  </p:clrMapOvr>
+</p:sld>
+</file>
+
+<file path=ppt/slides/slide5.xml><?xml version="1.0" encoding="utf-8"?>
+<p:sld xmlns:a="http://schemas.openxmlformats.org/drawingml/2006/main" xmlns:r="http://schemas.openxmlformats.org/officeDocument/2006/relationships" xmlns:p="http://schemas.openxmlformats.org/presentationml/2006/main">
+  <p:cSld>
+    <p:spTree>
+      <p:nvGrpSpPr>
+        <p:cNvPr id="1" name=""/>
+        <p:cNvGrpSpPr/>
+        <p:nvPr/>
+      </p:nvGrpSpPr>
+      <p:grpSpPr>
+        <a:xfrm>
+          <a:off x="0" y="0"/>
+          <a:ext cx="0" cy="0"/>
+          <a:chOff x="0" y="0"/>
+          <a:chExt cx="0" cy="0"/>
+        </a:xfrm>
+      </p:grpSpPr>
+      <p:sp>
+        <p:nvSpPr>
+          <p:cNvPr id="2" name="Rectángulo: esquinas redondeadas 1">
+            <a:extLst>
+              <a:ext uri="{FF2B5EF4-FFF2-40B4-BE49-F238E27FC236}">
+                <a16:creationId xmlns:a16="http://schemas.microsoft.com/office/drawing/2014/main" id="{309C93FF-9C62-40E2-8AD0-3AD6656C5E84}"/>
+              </a:ext>
+            </a:extLst>
+          </p:cNvPr>
+          <p:cNvSpPr/>
+          <p:nvPr/>
+        </p:nvSpPr>
+        <p:spPr>
+          <a:xfrm>
+            <a:off x="0" y="31989"/>
+            <a:ext cx="12013667" cy="516367"/>
+          </a:xfrm>
+          <a:prstGeom prst="roundRect">
+            <a:avLst/>
+          </a:prstGeom>
+          <a:solidFill>
+            <a:schemeClr val="tx2">
+              <a:lumMod val="75000"/>
+            </a:schemeClr>
+          </a:solidFill>
+        </p:spPr>
+        <p:style>
+          <a:lnRef idx="2">
+            <a:schemeClr val="accent1">
+              <a:shade val="50000"/>
+            </a:schemeClr>
+          </a:lnRef>
+          <a:fillRef idx="1">
+            <a:schemeClr val="accent1"/>
+          </a:fillRef>
+          <a:effectRef idx="0">
+            <a:schemeClr val="accent1"/>
+          </a:effectRef>
+          <a:fontRef idx="minor">
+            <a:schemeClr val="lt1"/>
+          </a:fontRef>
+        </p:style>
+        <p:txBody>
+          <a:bodyPr rtlCol="0" anchor="ctr"/>
+          <a:lstStyle/>
+          <a:p>
+            <a:pPr algn="ctr"/>
+            <a:r>
+              <a:rPr lang="es-CO" sz="2800" dirty="0">
+                <a:effectLst>
+                  <a:outerShdw blurRad="38100" dist="38100" dir="2700000" algn="tl">
+                    <a:srgbClr val="000000">
+                      <a:alpha val="43137"/>
+                    </a:srgbClr>
+                  </a:outerShdw>
+                </a:effectLst>
+              </a:rPr>
+              <a:t>Arquitectura - </a:t>
+            </a:r>
+            <a:r>
+              <a:rPr lang="es-CO" sz="2800" dirty="0" err="1">
+                <a:effectLst>
+                  <a:outerShdw blurRad="38100" dist="38100" dir="2700000" algn="tl">
+                    <a:srgbClr val="000000">
+                      <a:alpha val="43137"/>
+                    </a:srgbClr>
+                  </a:outerShdw>
+                </a:effectLst>
+              </a:rPr>
+              <a:t>Atom</a:t>
+            </a:r>
+            <a:r>
+              <a:rPr lang="es-CO" sz="2800" dirty="0">
+                <a:effectLst>
+                  <a:outerShdw blurRad="38100" dist="38100" dir="2700000" algn="tl">
+                    <a:srgbClr val="000000">
+                      <a:alpha val="43137"/>
+                    </a:srgbClr>
+                  </a:outerShdw>
+                </a:effectLst>
+              </a:rPr>
+              <a:t>-Huron </a:t>
+            </a:r>
+          </a:p>
+        </p:txBody>
+      </p:sp>
+      <p:grpSp>
+        <p:nvGrpSpPr>
+          <p:cNvPr id="49" name="Grupo 48">
+            <a:extLst>
+              <a:ext uri="{FF2B5EF4-FFF2-40B4-BE49-F238E27FC236}">
+                <a16:creationId xmlns:a16="http://schemas.microsoft.com/office/drawing/2014/main" id="{B1F8B1D6-59F2-4A39-9B9E-BFAE5C23BE92}"/>
+              </a:ext>
+            </a:extLst>
+          </p:cNvPr>
+          <p:cNvGrpSpPr/>
+          <p:nvPr/>
+        </p:nvGrpSpPr>
+        <p:grpSpPr>
+          <a:xfrm>
+            <a:off x="96819" y="699248"/>
+            <a:ext cx="1179019" cy="1247886"/>
+            <a:chOff x="3674529" y="2239734"/>
+            <a:chExt cx="3494616" cy="2912661"/>
+          </a:xfrm>
+        </p:grpSpPr>
+        <p:pic>
+          <p:nvPicPr>
+            <p:cNvPr id="53" name="Picture 6" descr="Science Atom Png - Atomo Icon Png Transparent PNG - 1024x1024 - Free  Download on NicePNG">
+              <a:extLst>
+                <a:ext uri="{FF2B5EF4-FFF2-40B4-BE49-F238E27FC236}">
+                  <a16:creationId xmlns:a16="http://schemas.microsoft.com/office/drawing/2014/main" id="{63A13782-F871-455C-A011-265AD25CFB7E}"/>
+                </a:ext>
+              </a:extLst>
+            </p:cNvPr>
+            <p:cNvPicPr>
+              <a:picLocks noChangeAspect="1" noChangeArrowheads="1"/>
+            </p:cNvPicPr>
+            <p:nvPr/>
+          </p:nvPicPr>
+          <p:blipFill>
+            <a:blip r:embed="rId2">
+              <a:extLst>
+                <a:ext uri="{BEBA8EAE-BF5A-486C-A8C5-ECC9F3942E4B}">
+                  <a14:imgProps xmlns:a14="http://schemas.microsoft.com/office/drawing/2010/main">
+                    <a14:imgLayer r:embed="rId3">
+                      <a14:imgEffect>
+                        <a14:backgroundRemoval t="5694" b="97516" l="1463" r="97683">
+                          <a14:foregroundMark x1="41707" y1="10766" x2="48293" y2="5797"/>
+                          <a14:foregroundMark x1="48293" y1="5797" x2="55610" y2="9938"/>
+                          <a14:foregroundMark x1="55610" y1="9938" x2="55976" y2="9938"/>
+                          <a14:foregroundMark x1="88049" y1="25052" x2="96829" y2="25052"/>
+                          <a14:foregroundMark x1="96829" y1="25052" x2="97683" y2="34886"/>
+                          <a14:foregroundMark x1="97683" y1="34886" x2="87927" y2="43375"/>
+                          <a14:foregroundMark x1="51341" y1="48240" x2="51341" y2="48240"/>
+                          <a14:foregroundMark x1="11463" y1="46791" x2="5122" y2="42340"/>
+                          <a14:foregroundMark x1="5122" y1="42340" x2="10854" y2="43996"/>
+                          <a14:foregroundMark x1="2683" y1="34783" x2="3049" y2="28157"/>
+                          <a14:foregroundMark x1="3415" y1="66460" x2="1707" y2="73810"/>
+                          <a14:foregroundMark x1="1707" y1="73810" x2="5854" y2="75983"/>
+                          <a14:foregroundMark x1="40000" y1="87474" x2="45366" y2="93271"/>
+                          <a14:foregroundMark x1="45366" y1="93271" x2="53902" y2="94203"/>
+                          <a14:foregroundMark x1="53902" y1="94203" x2="62439" y2="88716"/>
+                          <a14:foregroundMark x1="62439" y1="88716" x2="57805" y2="90166"/>
+                          <a14:foregroundMark x1="44634" y1="93582" x2="54146" y2="96687"/>
+                          <a14:foregroundMark x1="54146" y1="96687" x2="43537" y2="95238"/>
+                          <a14:foregroundMark x1="43537" y1="95238" x2="51341" y2="97516"/>
+                        </a14:backgroundRemoval>
+                      </a14:imgEffect>
+                    </a14:imgLayer>
+                  </a14:imgProps>
+                </a:ext>
+                <a:ext uri="{28A0092B-C50C-407E-A947-70E740481C1C}">
+                  <a14:useLocalDpi xmlns:a14="http://schemas.microsoft.com/office/drawing/2010/main" val="0"/>
+                </a:ext>
+              </a:extLst>
+            </a:blip>
+            <a:srcRect/>
+            <a:stretch>
+              <a:fillRect/>
+            </a:stretch>
+          </p:blipFill>
+          <p:spPr bwMode="auto">
+            <a:xfrm rot="19969979">
+              <a:off x="3674529" y="2239734"/>
+              <a:ext cx="2036585" cy="2399249"/>
+            </a:xfrm>
+            <a:prstGeom prst="rect">
+              <a:avLst/>
+            </a:prstGeom>
+            <a:noFill/>
+            <a:extLst>
+              <a:ext uri="{909E8E84-426E-40DD-AFC4-6F175D3DCCD1}">
+                <a14:hiddenFill xmlns:a14="http://schemas.microsoft.com/office/drawing/2010/main">
+                  <a:solidFill>
+                    <a:srgbClr val="FFFFFF"/>
+                  </a:solidFill>
+                </a14:hiddenFill>
+              </a:ext>
+            </a:extLst>
+          </p:spPr>
+        </p:pic>
+        <p:pic>
+          <p:nvPicPr>
+            <p:cNvPr id="58" name="Picture 2" descr="Legend of Korra Pabu&amp;quot; Kids T-Shirt by CassidyCreates | Redbubble">
+              <a:extLst>
+                <a:ext uri="{FF2B5EF4-FFF2-40B4-BE49-F238E27FC236}">
+                  <a16:creationId xmlns:a16="http://schemas.microsoft.com/office/drawing/2014/main" id="{6583D9AF-828B-4B21-9752-A768341FDAE6}"/>
+                </a:ext>
+              </a:extLst>
+            </p:cNvPr>
+            <p:cNvPicPr>
+              <a:picLocks noChangeAspect="1" noChangeArrowheads="1"/>
+            </p:cNvPicPr>
+            <p:nvPr/>
+          </p:nvPicPr>
+          <p:blipFill>
+            <a:blip r:embed="rId4">
+              <a:extLst>
+                <a:ext uri="{BEBA8EAE-BF5A-486C-A8C5-ECC9F3942E4B}">
+                  <a14:imgProps xmlns:a14="http://schemas.microsoft.com/office/drawing/2010/main">
+                    <a14:imgLayer r:embed="rId5">
+                      <a14:imgEffect>
+                        <a14:backgroundRemoval t="10000" b="90000" l="5200" r="94133">
+                          <a14:foregroundMark x1="25200" y1="15500" x2="15467" y2="15500"/>
+                          <a14:foregroundMark x1="15467" y1="15500" x2="15733" y2="22100"/>
+                          <a14:foregroundMark x1="16800" y1="16000" x2="45333" y2="15400"/>
+                          <a14:foregroundMark x1="45333" y1="15400" x2="52533" y2="23100"/>
+                          <a14:foregroundMark x1="52533" y1="23100" x2="43067" y2="25100"/>
+                          <a14:foregroundMark x1="43067" y1="25100" x2="16400" y2="23300"/>
+                          <a14:foregroundMark x1="16400" y1="23300" x2="13867" y2="16000"/>
+                          <a14:foregroundMark x1="13867" y1="16000" x2="24133" y2="14900"/>
+                          <a14:foregroundMark x1="24133" y1="14900" x2="28533" y2="17100"/>
+                          <a14:foregroundMark x1="83041" y1="58086" x2="92670" y2="70600"/>
+                          <a14:foregroundMark x1="93128" y1="75600" x2="91733" y2="79900"/>
+                          <a14:foregroundMark x1="93374" y1="74841" x2="93128" y2="75600"/>
+                          <a14:foregroundMark x1="91733" y1="79900" x2="83600" y2="85700"/>
+                          <a14:foregroundMark x1="83600" y1="85700" x2="82062" y2="58977"/>
+                          <a14:foregroundMark x1="13707" y1="75549" x2="10745" y2="75638"/>
+                          <a14:foregroundMark x1="8127" y1="74685" x2="13600" y2="72500"/>
+                          <a14:foregroundMark x1="13600" y1="72500" x2="14247" y2="73621"/>
+                          <a14:foregroundMark x1="9867" y1="66800" x2="15467" y2="61100"/>
+                          <a14:foregroundMark x1="16687" y1="55800" x2="17171" y2="53698"/>
+                          <a14:foregroundMark x1="15997" y1="58800" x2="16063" y2="58512"/>
+                          <a14:foregroundMark x1="15928" y1="59100" x2="15997" y2="58800"/>
+                          <a14:foregroundMark x1="15467" y1="61100" x2="15928" y2="59100"/>
+                          <a14:foregroundMark x1="22444" y1="30314" x2="16667" y2="24700"/>
+                          <a14:foregroundMark x1="16667" y1="24700" x2="15733" y2="21200"/>
+                          <a14:foregroundMark x1="93490" y1="74779" x2="93680" y2="75407"/>
+                          <a14:foregroundMark x1="92315" y1="70900" x2="93150" y2="73658"/>
+                          <a14:foregroundMark x1="92133" y1="70300" x2="92224" y2="70600"/>
+                          <a14:foregroundMark x1="87333" y1="63400" x2="91467" y2="78200"/>
+                          <a14:backgroundMark x1="82400" y1="57400" x2="82400" y2="57400"/>
+                          <a14:backgroundMark x1="82400" y1="57400" x2="83467" y2="57700"/>
+                          <a14:backgroundMark x1="83200" y1="58100" x2="83200" y2="58100"/>
+                          <a14:backgroundMark x1="82800" y1="57500" x2="83467" y2="57600"/>
+                          <a14:backgroundMark x1="83067" y1="57800" x2="83067" y2="57800"/>
+                          <a14:backgroundMark x1="16267" y1="74900" x2="13467" y2="75300"/>
+                          <a14:backgroundMark x1="11333" y1="76400" x2="4533" y2="75600"/>
+                          <a14:backgroundMark x1="9733" y1="67400" x2="9733" y2="67000"/>
+                          <a14:backgroundMark x1="9867" y1="66700" x2="9867" y2="66700"/>
+                          <a14:backgroundMark x1="16267" y1="57300" x2="16267" y2="57300"/>
+                          <a14:backgroundMark x1="16133" y1="56000" x2="15867" y2="58500"/>
+                          <a14:backgroundMark x1="16133" y1="58700" x2="16133" y2="58700"/>
+                          <a14:backgroundMark x1="16800" y1="56100" x2="16800" y2="56100"/>
+                          <a14:backgroundMark x1="16267" y1="56000" x2="16267" y2="56000"/>
+                          <a14:backgroundMark x1="16400" y1="55800" x2="16400" y2="55800"/>
+                          <a14:backgroundMark x1="16400" y1="56000" x2="16400" y2="56000"/>
+                          <a14:backgroundMark x1="16800" y1="56000" x2="16800" y2="56000"/>
+                          <a14:backgroundMark x1="15867" y1="59100" x2="15867" y2="59100"/>
+                          <a14:backgroundMark x1="15600" y1="58800" x2="15600" y2="58800"/>
+                          <a14:backgroundMark x1="17467" y1="50800" x2="21733" y2="31900"/>
+                          <a14:backgroundMark x1="21733" y1="31900" x2="18933" y2="31200"/>
+                          <a14:backgroundMark x1="20133" y1="46200" x2="20933" y2="33100"/>
+                          <a14:backgroundMark x1="22667" y1="36700" x2="19600" y2="30500"/>
+                          <a14:backgroundMark x1="21867" y1="35300" x2="22667" y2="33700"/>
+                          <a14:backgroundMark x1="21733" y1="36400" x2="20933" y2="31400"/>
+                          <a14:backgroundMark x1="20667" y1="30400" x2="18267" y2="48200"/>
+                          <a14:backgroundMark x1="14400" y1="37500" x2="14400" y2="40700"/>
+                          <a14:backgroundMark x1="18267" y1="48700" x2="18267" y2="48700"/>
+                          <a14:backgroundMark x1="17867" y1="47200" x2="18133" y2="49400"/>
+                          <a14:backgroundMark x1="96000" y1="75200" x2="95467" y2="78400"/>
+                          <a14:backgroundMark x1="94000" y1="73200" x2="94933" y2="74000"/>
+                          <a14:backgroundMark x1="94533" y1="75600" x2="94533" y2="75600"/>
+                          <a14:backgroundMark x1="93733" y1="70600" x2="93733" y2="70600"/>
+                          <a14:backgroundMark x1="93733" y1="70600" x2="93733" y2="70900"/>
+                        </a14:backgroundRemoval>
+                      </a14:imgEffect>
+                    </a14:imgLayer>
+                  </a14:imgProps>
+                </a:ext>
+                <a:ext uri="{28A0092B-C50C-407E-A947-70E740481C1C}">
+                  <a14:useLocalDpi xmlns:a14="http://schemas.microsoft.com/office/drawing/2010/main" val="0"/>
+                </a:ext>
+              </a:extLst>
+            </a:blip>
+            <a:srcRect/>
+            <a:stretch>
+              <a:fillRect/>
+            </a:stretch>
+          </p:blipFill>
+          <p:spPr bwMode="auto">
+            <a:xfrm>
+              <a:off x="5060955" y="2341476"/>
+              <a:ext cx="2108190" cy="2810919"/>
+            </a:xfrm>
+            <a:prstGeom prst="rect">
+              <a:avLst/>
+            </a:prstGeom>
+            <a:noFill/>
+            <a:effectLst>
+              <a:outerShdw blurRad="50800" dist="38100" dir="5400000" algn="t" rotWithShape="0">
+                <a:prstClr val="black">
+                  <a:alpha val="40000"/>
+                </a:prstClr>
+              </a:outerShdw>
+            </a:effectLst>
+            <a:extLst>
+              <a:ext uri="{909E8E84-426E-40DD-AFC4-6F175D3DCCD1}">
+                <a14:hiddenFill xmlns:a14="http://schemas.microsoft.com/office/drawing/2010/main">
+                  <a:solidFill>
+                    <a:srgbClr val="FFFFFF"/>
+                  </a:solidFill>
+                </a14:hiddenFill>
+              </a:ext>
+            </a:extLst>
+          </p:spPr>
+        </p:pic>
+      </p:grpSp>
+      <p:grpSp>
+        <p:nvGrpSpPr>
+          <p:cNvPr id="4" name="Grupo 3">
+            <a:extLst>
+              <a:ext uri="{FF2B5EF4-FFF2-40B4-BE49-F238E27FC236}">
+                <a16:creationId xmlns:a16="http://schemas.microsoft.com/office/drawing/2014/main" id="{16964CE2-3343-4BFB-98DE-61BE1CDB6F23}"/>
+              </a:ext>
+            </a:extLst>
+          </p:cNvPr>
+          <p:cNvGrpSpPr/>
+          <p:nvPr/>
+        </p:nvGrpSpPr>
+        <p:grpSpPr>
+          <a:xfrm>
+            <a:off x="1701188" y="710406"/>
+            <a:ext cx="778342" cy="806423"/>
+            <a:chOff x="5736908" y="1596390"/>
+            <a:chExt cx="2181225" cy="2640690"/>
+          </a:xfrm>
+        </p:grpSpPr>
+        <p:pic>
+          <p:nvPicPr>
+            <p:cNvPr id="1030" name="Picture 6" descr="What is MongoDB? The NoSQL database explained to you easily">
+              <a:extLst>
+                <a:ext uri="{FF2B5EF4-FFF2-40B4-BE49-F238E27FC236}">
+                  <a16:creationId xmlns:a16="http://schemas.microsoft.com/office/drawing/2014/main" id="{1BE1E969-2D2C-403E-B7D3-61E014BDAC12}"/>
+                </a:ext>
+              </a:extLst>
+            </p:cNvPr>
+            <p:cNvPicPr>
+              <a:picLocks noChangeAspect="1" noChangeArrowheads="1"/>
+            </p:cNvPicPr>
+            <p:nvPr/>
+          </p:nvPicPr>
+          <p:blipFill rotWithShape="1">
+            <a:blip r:embed="rId6">
+              <a:extLst>
+                <a:ext uri="{28A0092B-C50C-407E-A947-70E740481C1C}">
+                  <a14:useLocalDpi xmlns:a14="http://schemas.microsoft.com/office/drawing/2010/main" val="0"/>
+                </a:ext>
+              </a:extLst>
+            </a:blip>
+            <a:srcRect b="30841"/>
+            <a:stretch/>
+          </p:blipFill>
+          <p:spPr bwMode="auto">
+            <a:xfrm>
+              <a:off x="5736908" y="1596390"/>
+              <a:ext cx="2181225" cy="2028937"/>
+            </a:xfrm>
+            <a:prstGeom prst="rect">
+              <a:avLst/>
+            </a:prstGeom>
+            <a:noFill/>
+            <a:extLst>
+              <a:ext uri="{909E8E84-426E-40DD-AFC4-6F175D3DCCD1}">
+                <a14:hiddenFill xmlns:a14="http://schemas.microsoft.com/office/drawing/2010/main">
+                  <a:solidFill>
+                    <a:srgbClr val="FFFFFF"/>
+                  </a:solidFill>
+                </a14:hiddenFill>
+              </a:ext>
+            </a:extLst>
+          </p:spPr>
+        </p:pic>
+        <p:pic>
+          <p:nvPicPr>
+            <p:cNvPr id="1028" name="Picture 4" descr="MongoDB Atlas Adds Serverless Option | The Motley Fool">
+              <a:extLst>
+                <a:ext uri="{FF2B5EF4-FFF2-40B4-BE49-F238E27FC236}">
+                  <a16:creationId xmlns:a16="http://schemas.microsoft.com/office/drawing/2014/main" id="{599A8470-DB53-4169-8AD6-7B5B9116B70E}"/>
+                </a:ext>
+              </a:extLst>
+            </p:cNvPr>
+            <p:cNvPicPr>
+              <a:picLocks noChangeAspect="1" noChangeArrowheads="1"/>
+            </p:cNvPicPr>
+            <p:nvPr/>
+          </p:nvPicPr>
+          <p:blipFill rotWithShape="1">
+            <a:blip r:embed="rId7">
+              <a:extLst>
+                <a:ext uri="{28A0092B-C50C-407E-A947-70E740481C1C}">
+                  <a14:useLocalDpi xmlns:a14="http://schemas.microsoft.com/office/drawing/2010/main" val="0"/>
+                </a:ext>
+              </a:extLst>
+            </a:blip>
+            <a:srcRect l="37232" t="23216" r="36604" b="22509"/>
+            <a:stretch/>
+          </p:blipFill>
+          <p:spPr bwMode="auto">
+            <a:xfrm>
+              <a:off x="6935084" y="3013573"/>
+              <a:ext cx="983049" cy="1223507"/>
+            </a:xfrm>
+            <a:prstGeom prst="rect">
+              <a:avLst/>
+            </a:prstGeom>
+            <a:noFill/>
+            <a:extLst>
+              <a:ext uri="{909E8E84-426E-40DD-AFC4-6F175D3DCCD1}">
+                <a14:hiddenFill xmlns:a14="http://schemas.microsoft.com/office/drawing/2010/main">
+                  <a:solidFill>
+                    <a:srgbClr val="FFFFFF"/>
+                  </a:solidFill>
+                </a14:hiddenFill>
+              </a:ext>
+            </a:extLst>
+          </p:spPr>
+        </p:pic>
+      </p:grpSp>
+      <p:cxnSp>
+        <p:nvCxnSpPr>
+          <p:cNvPr id="8" name="Conector: curvado 7">
+            <a:extLst>
+              <a:ext uri="{FF2B5EF4-FFF2-40B4-BE49-F238E27FC236}">
+                <a16:creationId xmlns:a16="http://schemas.microsoft.com/office/drawing/2014/main" id="{2C8257CD-F569-446C-9C33-1588DFFF7733}"/>
+              </a:ext>
+            </a:extLst>
+          </p:cNvPr>
+          <p:cNvCxnSpPr>
+            <a:stCxn id="58" idx="3"/>
+            <a:endCxn id="1030" idx="1"/>
+          </p:cNvCxnSpPr>
+          <p:nvPr/>
+        </p:nvCxnSpPr>
+        <p:spPr>
+          <a:xfrm flipV="1">
+            <a:off x="1275838" y="1020208"/>
+            <a:ext cx="425350" cy="324778"/>
+          </a:xfrm>
+          <a:prstGeom prst="curvedConnector3">
+            <a:avLst/>
+          </a:prstGeom>
+          <a:ln w="12700">
+            <a:solidFill>
+              <a:schemeClr val="tx2">
+                <a:lumMod val="75000"/>
+              </a:schemeClr>
+            </a:solidFill>
+            <a:headEnd type="triangle"/>
+            <a:tailEnd type="triangle"/>
+          </a:ln>
+        </p:spPr>
+        <p:style>
+          <a:lnRef idx="1">
+            <a:schemeClr val="accent1"/>
+          </a:lnRef>
+          <a:fillRef idx="0">
+            <a:schemeClr val="accent1"/>
+          </a:fillRef>
+          <a:effectRef idx="0">
+            <a:schemeClr val="accent1"/>
+          </a:effectRef>
+          <a:fontRef idx="minor">
+            <a:schemeClr val="tx1"/>
+          </a:fontRef>
+        </p:style>
+      </p:cxnSp>
+      <p:pic>
+        <p:nvPicPr>
+          <p:cNvPr id="1032" name="Picture 8" descr="Logo Heroku PNG transparente - StickPNG">
+            <a:extLst>
+              <a:ext uri="{FF2B5EF4-FFF2-40B4-BE49-F238E27FC236}">
+                <a16:creationId xmlns:a16="http://schemas.microsoft.com/office/drawing/2014/main" id="{4E78052B-C847-4B7F-A1F6-AF15ED66295E}"/>
+              </a:ext>
+            </a:extLst>
+          </p:cNvPr>
+          <p:cNvPicPr>
+            <a:picLocks noChangeAspect="1" noChangeArrowheads="1"/>
+          </p:cNvPicPr>
+          <p:nvPr/>
+        </p:nvPicPr>
+        <p:blipFill>
+          <a:blip r:embed="rId8">
+            <a:extLst>
+              <a:ext uri="{28A0092B-C50C-407E-A947-70E740481C1C}">
+                <a14:useLocalDpi xmlns:a14="http://schemas.microsoft.com/office/drawing/2010/main" val="0"/>
+              </a:ext>
+            </a:extLst>
+          </a:blip>
+          <a:srcRect/>
+          <a:stretch>
+            <a:fillRect/>
+          </a:stretch>
+        </p:blipFill>
+        <p:spPr bwMode="auto">
+          <a:xfrm>
+            <a:off x="2479530" y="1646660"/>
+            <a:ext cx="600948" cy="600948"/>
+          </a:xfrm>
+          <a:prstGeom prst="rect">
+            <a:avLst/>
+          </a:prstGeom>
+          <a:noFill/>
+          <a:extLst>
+            <a:ext uri="{909E8E84-426E-40DD-AFC4-6F175D3DCCD1}">
+              <a14:hiddenFill xmlns:a14="http://schemas.microsoft.com/office/drawing/2010/main">
+                <a:solidFill>
+                  <a:srgbClr val="FFFFFF"/>
+                </a:solidFill>
+              </a14:hiddenFill>
+            </a:ext>
+          </a:extLst>
+        </p:spPr>
+      </p:pic>
+      <p:cxnSp>
+        <p:nvCxnSpPr>
+          <p:cNvPr id="51" name="Conector: curvado 50">
+            <a:extLst>
+              <a:ext uri="{FF2B5EF4-FFF2-40B4-BE49-F238E27FC236}">
+                <a16:creationId xmlns:a16="http://schemas.microsoft.com/office/drawing/2014/main" id="{44C6489F-4AB8-4C03-9A33-3B9C7C7728D7}"/>
+              </a:ext>
+            </a:extLst>
+          </p:cNvPr>
+          <p:cNvCxnSpPr>
+            <a:cxnSpLocks/>
+            <a:stCxn id="58" idx="3"/>
+            <a:endCxn id="1032" idx="1"/>
+          </p:cNvCxnSpPr>
+          <p:nvPr/>
+        </p:nvCxnSpPr>
+        <p:spPr>
+          <a:xfrm>
+            <a:off x="1275838" y="1344986"/>
+            <a:ext cx="1203692" cy="602148"/>
+          </a:xfrm>
+          <a:prstGeom prst="curvedConnector3">
+            <a:avLst>
+              <a:gd name="adj1" fmla="val 50000"/>
+            </a:avLst>
+          </a:prstGeom>
+          <a:ln w="9525">
+            <a:solidFill>
+              <a:schemeClr val="tx2">
+                <a:lumMod val="75000"/>
+              </a:schemeClr>
+            </a:solidFill>
+            <a:headEnd type="triangle"/>
+            <a:tailEnd type="triangle"/>
+          </a:ln>
+        </p:spPr>
+        <p:style>
+          <a:lnRef idx="1">
+            <a:schemeClr val="accent1"/>
+          </a:lnRef>
+          <a:fillRef idx="0">
+            <a:schemeClr val="accent1"/>
+          </a:fillRef>
+          <a:effectRef idx="0">
+            <a:schemeClr val="accent1"/>
+          </a:effectRef>
+          <a:fontRef idx="minor">
+            <a:schemeClr val="tx1"/>
+          </a:fontRef>
+        </p:style>
+      </p:cxnSp>
+      <p:cxnSp>
+        <p:nvCxnSpPr>
+          <p:cNvPr id="52" name="Conector: curvado 51">
+            <a:extLst>
+              <a:ext uri="{FF2B5EF4-FFF2-40B4-BE49-F238E27FC236}">
+                <a16:creationId xmlns:a16="http://schemas.microsoft.com/office/drawing/2014/main" id="{7DCAE7C1-4F43-40C1-A0BB-900BB6620A9F}"/>
+              </a:ext>
+            </a:extLst>
+          </p:cNvPr>
+          <p:cNvCxnSpPr>
+            <a:cxnSpLocks/>
+            <a:stCxn id="1032" idx="0"/>
+            <a:endCxn id="1030" idx="3"/>
+          </p:cNvCxnSpPr>
+          <p:nvPr/>
+        </p:nvCxnSpPr>
+        <p:spPr>
+          <a:xfrm rot="16200000" flipV="1">
+            <a:off x="2316541" y="1183197"/>
+            <a:ext cx="626452" cy="300474"/>
+          </a:xfrm>
+          <a:prstGeom prst="curvedConnector2">
+            <a:avLst/>
+          </a:prstGeom>
+          <a:ln w="12700">
+            <a:solidFill>
+              <a:schemeClr val="tx2">
+                <a:lumMod val="75000"/>
+              </a:schemeClr>
+            </a:solidFill>
+            <a:headEnd type="triangle"/>
+            <a:tailEnd type="triangle"/>
+          </a:ln>
+        </p:spPr>
+        <p:style>
+          <a:lnRef idx="1">
+            <a:schemeClr val="accent1"/>
+          </a:lnRef>
+          <a:fillRef idx="0">
+            <a:schemeClr val="accent1"/>
+          </a:fillRef>
+          <a:effectRef idx="0">
+            <a:schemeClr val="accent1"/>
+          </a:effectRef>
+          <a:fontRef idx="minor">
+            <a:schemeClr val="tx1"/>
+          </a:fontRef>
+        </p:style>
+      </p:cxnSp>
+      <p:pic>
+        <p:nvPicPr>
+          <p:cNvPr id="27" name="Gráfico 26" descr="Completado con relleno sólido">
+            <a:extLst>
+              <a:ext uri="{FF2B5EF4-FFF2-40B4-BE49-F238E27FC236}">
+                <a16:creationId xmlns:a16="http://schemas.microsoft.com/office/drawing/2014/main" id="{AE6245A4-192B-41A1-B35E-1FA4670B4F9C}"/>
+              </a:ext>
+            </a:extLst>
+          </p:cNvPr>
+          <p:cNvPicPr>
+            <a:picLocks noChangeAspect="1"/>
+          </p:cNvPicPr>
+          <p:nvPr/>
+        </p:nvPicPr>
+        <p:blipFill>
+          <a:blip r:embed="rId9">
+            <a:extLst>
+              <a:ext uri="{28A0092B-C50C-407E-A947-70E740481C1C}">
+                <a14:useLocalDpi xmlns:a14="http://schemas.microsoft.com/office/drawing/2010/main" val="0"/>
+              </a:ext>
+              <a:ext uri="{96DAC541-7B7A-43D3-8B79-37D633B846F1}">
+                <asvg:svgBlip xmlns:asvg="http://schemas.microsoft.com/office/drawing/2016/SVG/main" r:embed="rId10"/>
+              </a:ext>
+            </a:extLst>
+          </a:blip>
+          <a:stretch>
+            <a:fillRect/>
+          </a:stretch>
+        </p:blipFill>
+        <p:spPr>
+          <a:xfrm>
+            <a:off x="1195787" y="746393"/>
+            <a:ext cx="422714" cy="547630"/>
+          </a:xfrm>
+          <a:prstGeom prst="rect">
+            <a:avLst/>
+          </a:prstGeom>
+        </p:spPr>
+      </p:pic>
+      <p:sp>
+        <p:nvSpPr>
+          <p:cNvPr id="16" name="Rectángulo: esquinas redondeadas 15">
+            <a:extLst>
+              <a:ext uri="{FF2B5EF4-FFF2-40B4-BE49-F238E27FC236}">
+                <a16:creationId xmlns:a16="http://schemas.microsoft.com/office/drawing/2014/main" id="{8CED36E8-D6B8-46E2-A07F-6951FE937F04}"/>
+              </a:ext>
+            </a:extLst>
+          </p:cNvPr>
+          <p:cNvSpPr/>
+          <p:nvPr/>
+        </p:nvSpPr>
+        <p:spPr>
+          <a:xfrm>
+            <a:off x="1901542" y="2669930"/>
+            <a:ext cx="1091427" cy="430305"/>
+          </a:xfrm>
+          <a:prstGeom prst="roundRect">
+            <a:avLst/>
+          </a:prstGeom>
+          <a:noFill/>
+          <a:ln w="38100"/>
+        </p:spPr>
+        <p:style>
+          <a:lnRef idx="2">
+            <a:schemeClr val="accent1">
+              <a:shade val="50000"/>
+            </a:schemeClr>
+          </a:lnRef>
+          <a:fillRef idx="1">
+            <a:schemeClr val="accent1"/>
+          </a:fillRef>
+          <a:effectRef idx="0">
+            <a:schemeClr val="accent1"/>
+          </a:effectRef>
+          <a:fontRef idx="minor">
+            <a:schemeClr val="lt1"/>
+          </a:fontRef>
+        </p:style>
+        <p:txBody>
+          <a:bodyPr rtlCol="0" anchor="ctr"/>
+          <a:lstStyle/>
+          <a:p>
+            <a:pPr algn="ctr"/>
+            <a:endParaRPr lang="es-CO"/>
+          </a:p>
+        </p:txBody>
+      </p:sp>
+      <p:pic>
+        <p:nvPicPr>
+          <p:cNvPr id="19" name="Imagen 18" descr="Captura de pantalla de computadora&#10;&#10;Descripción generada automáticamente">
+            <a:extLst>
+              <a:ext uri="{FF2B5EF4-FFF2-40B4-BE49-F238E27FC236}">
+                <a16:creationId xmlns:a16="http://schemas.microsoft.com/office/drawing/2014/main" id="{4E64594E-542A-49CE-AA38-C45C2A1BD1C2}"/>
+              </a:ext>
+            </a:extLst>
+          </p:cNvPr>
+          <p:cNvPicPr>
+            <a:picLocks noChangeAspect="1"/>
+          </p:cNvPicPr>
+          <p:nvPr/>
+        </p:nvPicPr>
+        <p:blipFill rotWithShape="1">
+          <a:blip r:embed="rId11"/>
+          <a:srcRect l="1473" t="10521" r="48647" b="16518"/>
+          <a:stretch/>
+        </p:blipFill>
+        <p:spPr>
+          <a:xfrm>
+            <a:off x="3683222" y="623804"/>
+            <a:ext cx="7722113" cy="3638972"/>
+          </a:xfrm>
+          <a:prstGeom prst="rect">
+            <a:avLst/>
+          </a:prstGeom>
+        </p:spPr>
+      </p:pic>
+      <p:pic>
+        <p:nvPicPr>
+          <p:cNvPr id="15" name="Imagen 14" descr="Interfaz de usuario gráfica, Texto, Aplicación&#10;&#10;Descripción generada automáticamente">
+            <a:extLst>
+              <a:ext uri="{FF2B5EF4-FFF2-40B4-BE49-F238E27FC236}">
+                <a16:creationId xmlns:a16="http://schemas.microsoft.com/office/drawing/2014/main" id="{2941EE5D-B480-4DDE-AE1F-627DC25F71B8}"/>
+              </a:ext>
+            </a:extLst>
+          </p:cNvPr>
+          <p:cNvPicPr>
+            <a:picLocks noChangeAspect="1"/>
+          </p:cNvPicPr>
+          <p:nvPr/>
+        </p:nvPicPr>
+        <p:blipFill rotWithShape="1">
+          <a:blip r:embed="rId12"/>
+          <a:srcRect l="51637" t="17539"/>
+          <a:stretch/>
+        </p:blipFill>
+        <p:spPr>
+          <a:xfrm>
+            <a:off x="179495" y="2443290"/>
+            <a:ext cx="5827338" cy="3463794"/>
+          </a:xfrm>
+          <a:prstGeom prst="rect">
+            <a:avLst/>
+          </a:prstGeom>
+          <a:ln>
+            <a:noFill/>
+          </a:ln>
+          <a:effectLst>
+            <a:softEdge rad="112500"/>
+          </a:effectLst>
+        </p:spPr>
+      </p:pic>
+      <p:sp>
+        <p:nvSpPr>
+          <p:cNvPr id="17" name="Flecha: hacia abajo 16">
+            <a:extLst>
+              <a:ext uri="{FF2B5EF4-FFF2-40B4-BE49-F238E27FC236}">
+                <a16:creationId xmlns:a16="http://schemas.microsoft.com/office/drawing/2014/main" id="{6CE3995A-1081-47D5-91FC-EC38FE2AA51B}"/>
+              </a:ext>
+            </a:extLst>
+          </p:cNvPr>
+          <p:cNvSpPr/>
+          <p:nvPr/>
+        </p:nvSpPr>
+        <p:spPr>
+          <a:xfrm>
+            <a:off x="2130742" y="2311112"/>
+            <a:ext cx="216425" cy="422322"/>
+          </a:xfrm>
+          <a:prstGeom prst="downArrow">
+            <a:avLst/>
+          </a:prstGeom>
+          <a:solidFill>
+            <a:schemeClr val="accent1">
+              <a:lumMod val="50000"/>
+            </a:schemeClr>
+          </a:solidFill>
+        </p:spPr>
+        <p:style>
+          <a:lnRef idx="2">
+            <a:schemeClr val="accent1">
+              <a:shade val="50000"/>
+            </a:schemeClr>
+          </a:lnRef>
+          <a:fillRef idx="1">
+            <a:schemeClr val="accent1"/>
+          </a:fillRef>
+          <a:effectRef idx="0">
+            <a:schemeClr val="accent1"/>
+          </a:effectRef>
+          <a:fontRef idx="minor">
+            <a:schemeClr val="lt1"/>
+          </a:fontRef>
+        </p:style>
+        <p:txBody>
+          <a:bodyPr rtlCol="0" anchor="ctr"/>
+          <a:lstStyle/>
+          <a:p>
+            <a:pPr algn="ctr"/>
+            <a:endParaRPr lang="es-CO"/>
+          </a:p>
+        </p:txBody>
+      </p:sp>
+      <p:sp>
+        <p:nvSpPr>
+          <p:cNvPr id="20" name="Flecha: a la derecha 19">
+            <a:extLst>
+              <a:ext uri="{FF2B5EF4-FFF2-40B4-BE49-F238E27FC236}">
+                <a16:creationId xmlns:a16="http://schemas.microsoft.com/office/drawing/2014/main" id="{C9EF999B-BCF0-4128-AAF3-8C70A02878BF}"/>
+              </a:ext>
+            </a:extLst>
+          </p:cNvPr>
+          <p:cNvSpPr/>
+          <p:nvPr/>
+        </p:nvSpPr>
+        <p:spPr>
+          <a:xfrm>
+            <a:off x="6006833" y="2563093"/>
+            <a:ext cx="3782626" cy="537142"/>
+          </a:xfrm>
+          <a:prstGeom prst="rightArrow">
+            <a:avLst/>
+          </a:prstGeom>
+          <a:solidFill>
+            <a:schemeClr val="accent1">
+              <a:lumMod val="50000"/>
+            </a:schemeClr>
+          </a:solidFill>
+        </p:spPr>
+        <p:style>
+          <a:lnRef idx="2">
+            <a:schemeClr val="accent1">
+              <a:shade val="50000"/>
+            </a:schemeClr>
+          </a:lnRef>
+          <a:fillRef idx="1">
+            <a:schemeClr val="accent1"/>
+          </a:fillRef>
+          <a:effectRef idx="0">
+            <a:schemeClr val="accent1"/>
+          </a:effectRef>
+          <a:fontRef idx="minor">
+            <a:schemeClr val="lt1"/>
+          </a:fontRef>
+        </p:style>
+        <p:txBody>
+          <a:bodyPr rtlCol="0" anchor="ctr"/>
+          <a:lstStyle/>
+          <a:p>
+            <a:pPr algn="ctr"/>
+            <a:endParaRPr lang="es-CO"/>
+          </a:p>
+        </p:txBody>
+      </p:sp>
+    </p:spTree>
+    <p:extLst>
+      <p:ext uri="{BB962C8B-B14F-4D97-AF65-F5344CB8AC3E}">
+        <p14:creationId xmlns:p14="http://schemas.microsoft.com/office/powerpoint/2010/main" val="3788968143"/>
+      </p:ext>
+    </p:extLst>
+  </p:cSld>
+  <p:clrMapOvr>
+    <a:masterClrMapping/>
+  </p:clrMapOvr>
+</p:sld>
+</file>
+
 <file path=ppt/theme/theme1.xml><?xml version="1.0" encoding="utf-8"?>
 <a:theme xmlns:a="http://schemas.openxmlformats.org/drawingml/2006/main" name="Tema de Office">
   <a:themeElements>

</xml_diff>